<commit_message>
Ejercicio y solución para Coding time!
</commit_message>
<xml_diff>
--- a/Designing Testable Applications - .NET Conf AR v2018.pptx
+++ b/Designing Testable Applications - .NET Conf AR v2018.pptx
@@ -4401,7 +4401,6 @@
               <a:rPr lang="en-US" dirty="0"/>
               <a:t> a interfaces</a:t>
             </a:r>
-            <a:endParaRPr lang="en-US" dirty="0"/>
           </a:p>
         </p:txBody>
       </p:sp>
@@ -7831,7 +7830,6 @@
               <a:rPr lang="es-AR" dirty="0"/>
               <a:t>?</a:t>
             </a:r>
-            <a:endParaRPr lang="es-AR" dirty="0"/>
           </a:p>
         </p:txBody>
       </p:sp>
@@ -9289,7 +9287,6 @@
               <a:rPr lang="en-US" dirty="0"/>
               <a:t>El “Legacy Code Change Algorithm”</a:t>
             </a:r>
-            <a:endParaRPr lang="en-US" dirty="0"/>
           </a:p>
         </p:txBody>
       </p:sp>
@@ -9701,145 +9698,157 @@
           <a:p>
             <a:pPr lvl="1"/>
             <a:r>
-              <a:rPr lang="es-AR" sz="2000" dirty="0"/>
-              <a:t>Como la empresa está festejando su 27° aniversario, los directivos decidieron ofrecer una promoción especial</a:t>
-            </a:r>
-            <a:r>
-              <a:rPr lang="es-AR" sz="2000" dirty="0" smtClean="0"/>
-              <a:t>. Los </a:t>
-            </a:r>
-            <a:r>
-              <a:rPr lang="es-AR" sz="2000" dirty="0"/>
-              <a:t>clientes que compren frecuentemente serán beneficiados a partir de un esquema de puntos obtenidos mediante cada compra, con los que </a:t>
-            </a:r>
-            <a:r>
-              <a:rPr lang="es-AR" sz="2000" dirty="0" smtClean="0"/>
-              <a:t>accederán a </a:t>
-            </a:r>
-            <a:r>
-              <a:rPr lang="es-AR" sz="2000" dirty="0"/>
-              <a:t>beneficios desopilantes.</a:t>
-            </a:r>
+              <a:rPr lang="es-AR" dirty="0" smtClean="0"/>
+              <a:t>Como </a:t>
+            </a:r>
+            <a:r>
+              <a:rPr lang="es-AR" dirty="0"/>
+              <a:t>la empresa </a:t>
+            </a:r>
+            <a:r>
+              <a:rPr lang="es-AR" dirty="0" smtClean="0"/>
+              <a:t>de venta de productos tecnológicos está </a:t>
+            </a:r>
+            <a:r>
+              <a:rPr lang="es-AR" dirty="0"/>
+              <a:t>festejando su 27° aniversario, los directivos decidieron ofrecer </a:t>
+            </a:r>
+            <a:r>
+              <a:rPr lang="es-AR" dirty="0" smtClean="0"/>
+              <a:t>un incentivo especial a sus clientes: quienes realicen compras superiores a $20.000, recibirán un “</a:t>
+            </a:r>
+            <a:r>
+              <a:rPr lang="es-AR" i="1" dirty="0" smtClean="0"/>
+              <a:t>Pen Drive</a:t>
+            </a:r>
+            <a:r>
+              <a:rPr lang="es-AR" dirty="0" smtClean="0"/>
+              <a:t>” de regalo</a:t>
+            </a:r>
+            <a:endParaRPr lang="es-AR" dirty="0"/>
           </a:p>
           <a:p>
             <a:pPr lvl="1"/>
             <a:r>
-              <a:rPr lang="es-AR" sz="2000" dirty="0"/>
-              <a:t>Los puntos se otorgarán según los siguientes rangos:</a:t>
-            </a:r>
-          </a:p>
-          <a:p>
-            <a:pPr lvl="2">
-              <a:spcBef>
-                <a:spcPts val="0"/>
-              </a:spcBef>
-            </a:pPr>
-            <a:r>
-              <a:rPr lang="es-AR" sz="1800" dirty="0"/>
-              <a:t>Compra entre $1 y $4999: Puntos otorgados = Monto Compra * 1</a:t>
-            </a:r>
-          </a:p>
-          <a:p>
-            <a:pPr lvl="2">
-              <a:spcBef>
-                <a:spcPts val="0"/>
-              </a:spcBef>
-            </a:pPr>
-            <a:r>
-              <a:rPr lang="es-AR" sz="1800" dirty="0"/>
-              <a:t>Compra entre $5000 y $9999: Puntos otorgados = Monto Compra * 2</a:t>
-            </a:r>
-          </a:p>
-          <a:p>
-            <a:pPr lvl="2">
-              <a:spcBef>
-                <a:spcPts val="0"/>
-              </a:spcBef>
-            </a:pPr>
-            <a:r>
-              <a:rPr lang="es-AR" sz="1800" dirty="0"/>
-              <a:t>Compra entre $10000 y $19999: Puntos otorgados = Monto Compra * 3</a:t>
-            </a:r>
-          </a:p>
-          <a:p>
-            <a:pPr lvl="2">
-              <a:spcBef>
-                <a:spcPts val="0"/>
-              </a:spcBef>
-            </a:pPr>
-            <a:r>
-              <a:rPr lang="es-AR" sz="1800" dirty="0"/>
-              <a:t>Compra mayor a $20000: Puntos otorgados = Monto Compra * 4</a:t>
+              <a:rPr lang="es-AR" dirty="0" smtClean="0"/>
+              <a:t>Implementar </a:t>
+            </a:r>
+            <a:r>
+              <a:rPr lang="es-AR" dirty="0"/>
+              <a:t>los nuevos requerimientos de </a:t>
+            </a:r>
+            <a:r>
+              <a:rPr lang="es-AR" dirty="0" smtClean="0"/>
+              <a:t>negocio sin que se </a:t>
+            </a:r>
+            <a:r>
+              <a:rPr lang="es-AR" dirty="0"/>
+              <a:t>vea afectada la funcionalidad </a:t>
+            </a:r>
+            <a:r>
+              <a:rPr lang="es-AR" dirty="0" smtClean="0"/>
+              <a:t>actual</a:t>
             </a:r>
           </a:p>
           <a:p>
             <a:pPr lvl="1"/>
             <a:r>
-              <a:rPr lang="es-AR" sz="2000" dirty="0" smtClean="0"/>
-              <a:t>Implementar </a:t>
-            </a:r>
-            <a:r>
-              <a:rPr lang="es-AR" sz="2000" dirty="0"/>
-              <a:t>los nuevos requerimientos de negocio, asegurando mediante </a:t>
-            </a:r>
-            <a:r>
-              <a:rPr lang="es-AR" sz="2000" dirty="0" err="1"/>
+              <a:rPr lang="es-AR" dirty="0" smtClean="0"/>
+              <a:t>Asegurar mediante </a:t>
+            </a:r>
+            <a:r>
+              <a:rPr lang="es-AR" dirty="0" err="1"/>
               <a:t>tests</a:t>
             </a:r>
             <a:r>
-              <a:rPr lang="es-AR" sz="2000" dirty="0"/>
-              <a:t> unitarios, que se cumplan adecuadamente y que no se vea afectada la funcionalidad </a:t>
-            </a:r>
-            <a:r>
-              <a:rPr lang="es-AR" sz="2000" dirty="0" smtClean="0"/>
-              <a:t>actual.</a:t>
-            </a:r>
-            <a:endParaRPr lang="es-AR" sz="2000" dirty="0"/>
+              <a:rPr lang="es-AR" dirty="0"/>
+              <a:t> </a:t>
+            </a:r>
+            <a:r>
+              <a:rPr lang="es-AR" dirty="0" smtClean="0"/>
+              <a:t>unitarios de la clase </a:t>
+            </a:r>
+            <a:r>
+              <a:rPr lang="es-AR" dirty="0" err="1" smtClean="0"/>
+              <a:t>OrdersService</a:t>
+            </a:r>
+            <a:r>
+              <a:rPr lang="es-AR" dirty="0" smtClean="0"/>
+              <a:t> </a:t>
+            </a:r>
+            <a:r>
+              <a:rPr lang="es-AR" dirty="0"/>
+              <a:t>que los </a:t>
+            </a:r>
+            <a:r>
+              <a:rPr lang="es-AR" dirty="0" smtClean="0"/>
+              <a:t>nuevos requerimientos se </a:t>
+            </a:r>
+            <a:r>
+              <a:rPr lang="es-AR" dirty="0"/>
+              <a:t>cumplan </a:t>
+            </a:r>
+            <a:r>
+              <a:rPr lang="es-AR" dirty="0" smtClean="0"/>
+              <a:t>adecuadamente</a:t>
+            </a:r>
+            <a:endParaRPr lang="es-AR" dirty="0"/>
           </a:p>
           <a:p>
             <a:pPr lvl="1"/>
             <a:r>
-              <a:rPr lang="es-AR" sz="2000" dirty="0"/>
+              <a:rPr lang="es-AR" dirty="0" smtClean="0"/>
               <a:t>Los </a:t>
             </a:r>
             <a:r>
-              <a:rPr lang="es-AR" sz="2000" dirty="0" err="1"/>
+              <a:rPr lang="es-AR" dirty="0" err="1" smtClean="0"/>
               <a:t>tests</a:t>
             </a:r>
             <a:r>
-              <a:rPr lang="es-AR" sz="2000" dirty="0"/>
-              <a:t> </a:t>
-            </a:r>
-            <a:r>
-              <a:rPr lang="es-AR" sz="2000" dirty="0" smtClean="0"/>
-              <a:t>que </a:t>
-            </a:r>
-            <a:r>
-              <a:rPr lang="es-AR" sz="2000" dirty="0"/>
-              <a:t>ya tiene la aplicación deben seguir ejecutando exitosamente.</a:t>
-            </a:r>
+              <a:rPr lang="es-AR" dirty="0" smtClean="0"/>
+              <a:t> que </a:t>
+            </a:r>
+            <a:r>
+              <a:rPr lang="es-AR" dirty="0"/>
+              <a:t>ya tiene la aplicación </a:t>
+            </a:r>
+            <a:r>
+              <a:rPr lang="es-AR" dirty="0" smtClean="0"/>
+              <a:t>deben </a:t>
+            </a:r>
+            <a:r>
+              <a:rPr lang="es-AR" dirty="0"/>
+              <a:t>seguir ejecutando </a:t>
+            </a:r>
+            <a:r>
+              <a:rPr lang="es-AR" dirty="0" smtClean="0"/>
+              <a:t>exitosamente</a:t>
+            </a:r>
+            <a:endParaRPr lang="es-AR" dirty="0"/>
           </a:p>
           <a:p>
             <a:pPr lvl="1"/>
             <a:r>
-              <a:rPr lang="es-AR" sz="2000" dirty="0"/>
-              <a:t>Se permite (¡y recomienda!) hacer todos los cambios que sean necesarios para que </a:t>
-            </a:r>
-            <a:br>
-              <a:rPr lang="es-AR" sz="2000" dirty="0"/>
-            </a:br>
-            <a:r>
-              <a:rPr lang="es-AR" sz="2000" dirty="0"/>
-              <a:t>la aplicación sea </a:t>
-            </a:r>
-            <a:r>
-              <a:rPr lang="es-AR" sz="2000" dirty="0" err="1"/>
+              <a:rPr lang="es-AR" dirty="0"/>
+              <a:t>Se permite (¡y recomienda!) hacer todos los cambios que sean necesarios para </a:t>
+            </a:r>
+            <a:r>
+              <a:rPr lang="es-AR" dirty="0" smtClean="0"/>
+              <a:t>que la </a:t>
+            </a:r>
+            <a:r>
+              <a:rPr lang="es-AR" dirty="0"/>
+              <a:t>aplicación sea </a:t>
+            </a:r>
+            <a:r>
+              <a:rPr lang="es-AR" dirty="0" err="1" smtClean="0"/>
               <a:t>testeable</a:t>
             </a:r>
             <a:r>
-              <a:rPr lang="es-AR" sz="2000" dirty="0"/>
-              <a:t>.</a:t>
-            </a:r>
+              <a:rPr lang="es-AR" dirty="0" smtClean="0"/>
+              <a:t> de forma unitaria</a:t>
+            </a:r>
+            <a:endParaRPr lang="es-AR" dirty="0"/>
           </a:p>
         </p:txBody>
       </p:sp>
@@ -10023,7 +10032,6 @@
               <a:rPr lang="en-US" sz="2000" dirty="0"/>
               <a:t>https://www.linkedin.com/in/leandrogoldin</a:t>
             </a:r>
-            <a:endParaRPr lang="en-US" sz="2000" dirty="0"/>
           </a:p>
         </p:txBody>
       </p:sp>
@@ -11255,11 +11263,7 @@
             </a:r>
             <a:r>
               <a:rPr lang="es-AR" dirty="0"/>
-              <a:t>. </a:t>
-            </a:r>
-            <a:r>
-              <a:rPr lang="es-AR" dirty="0"/>
-              <a:t>¿Por dónde </a:t>
+              <a:t>. ¿Por dónde </a:t>
             </a:r>
             <a:r>
               <a:rPr lang="es-AR" dirty="0" smtClean="0"/>
@@ -11447,15 +11451,7 @@
           <a:p>
             <a:r>
               <a:rPr lang="es-AR" altLang="es-AR" dirty="0"/>
-              <a:t>¿</a:t>
-            </a:r>
-            <a:r>
-              <a:rPr lang="es-AR" altLang="es-AR" dirty="0"/>
-              <a:t>Qué</a:t>
-            </a:r>
-            <a:r>
-              <a:rPr lang="es-AR" altLang="es-AR" dirty="0"/>
-              <a:t> es un test?</a:t>
+              <a:t>¿Qué es un test?</a:t>
             </a:r>
           </a:p>
           <a:p>

</xml_diff>

<commit_message>
PPT .NET Conf AR v2018
</commit_message>
<xml_diff>
--- a/Designing Testable Applications - .NET Conf AR v2018.pptx
+++ b/Designing Testable Applications - .NET Conf AR v2018.pptx
@@ -5,41 +5,42 @@
     <p:sldMasterId id="2147483658" r:id="rId1"/>
   </p:sldMasterIdLst>
   <p:notesMasterIdLst>
-    <p:notesMasterId r:id="rId34"/>
+    <p:notesMasterId r:id="rId35"/>
   </p:notesMasterIdLst>
   <p:sldIdLst>
     <p:sldId id="256" r:id="rId2"/>
     <p:sldId id="257" r:id="rId3"/>
-    <p:sldId id="272" r:id="rId4"/>
-    <p:sldId id="259" r:id="rId5"/>
-    <p:sldId id="273" r:id="rId6"/>
-    <p:sldId id="260" r:id="rId7"/>
-    <p:sldId id="261" r:id="rId8"/>
-    <p:sldId id="262" r:id="rId9"/>
-    <p:sldId id="290" r:id="rId10"/>
-    <p:sldId id="271" r:id="rId11"/>
-    <p:sldId id="263" r:id="rId12"/>
-    <p:sldId id="264" r:id="rId13"/>
-    <p:sldId id="265" r:id="rId14"/>
-    <p:sldId id="266" r:id="rId15"/>
-    <p:sldId id="267" r:id="rId16"/>
-    <p:sldId id="268" r:id="rId17"/>
-    <p:sldId id="269" r:id="rId18"/>
-    <p:sldId id="270" r:id="rId19"/>
-    <p:sldId id="275" r:id="rId20"/>
-    <p:sldId id="282" r:id="rId21"/>
-    <p:sldId id="289" r:id="rId22"/>
-    <p:sldId id="276" r:id="rId23"/>
-    <p:sldId id="277" r:id="rId24"/>
-    <p:sldId id="278" r:id="rId25"/>
-    <p:sldId id="279" r:id="rId26"/>
-    <p:sldId id="280" r:id="rId27"/>
-    <p:sldId id="281" r:id="rId28"/>
-    <p:sldId id="283" r:id="rId29"/>
-    <p:sldId id="286" r:id="rId30"/>
-    <p:sldId id="284" r:id="rId31"/>
-    <p:sldId id="287" r:id="rId32"/>
-    <p:sldId id="258" r:id="rId33"/>
+    <p:sldId id="291" r:id="rId4"/>
+    <p:sldId id="272" r:id="rId5"/>
+    <p:sldId id="259" r:id="rId6"/>
+    <p:sldId id="273" r:id="rId7"/>
+    <p:sldId id="260" r:id="rId8"/>
+    <p:sldId id="261" r:id="rId9"/>
+    <p:sldId id="262" r:id="rId10"/>
+    <p:sldId id="290" r:id="rId11"/>
+    <p:sldId id="271" r:id="rId12"/>
+    <p:sldId id="263" r:id="rId13"/>
+    <p:sldId id="264" r:id="rId14"/>
+    <p:sldId id="265" r:id="rId15"/>
+    <p:sldId id="266" r:id="rId16"/>
+    <p:sldId id="267" r:id="rId17"/>
+    <p:sldId id="268" r:id="rId18"/>
+    <p:sldId id="269" r:id="rId19"/>
+    <p:sldId id="270" r:id="rId20"/>
+    <p:sldId id="275" r:id="rId21"/>
+    <p:sldId id="282" r:id="rId22"/>
+    <p:sldId id="289" r:id="rId23"/>
+    <p:sldId id="276" r:id="rId24"/>
+    <p:sldId id="277" r:id="rId25"/>
+    <p:sldId id="278" r:id="rId26"/>
+    <p:sldId id="279" r:id="rId27"/>
+    <p:sldId id="280" r:id="rId28"/>
+    <p:sldId id="281" r:id="rId29"/>
+    <p:sldId id="283" r:id="rId30"/>
+    <p:sldId id="286" r:id="rId31"/>
+    <p:sldId id="284" r:id="rId32"/>
+    <p:sldId id="287" r:id="rId33"/>
+    <p:sldId id="258" r:id="rId34"/>
   </p:sldIdLst>
   <p:sldSz cx="12192000" cy="6858000"/>
   <p:notesSz cx="6858000" cy="9144000"/>
@@ -660,7 +661,7 @@
           <a:p>
             <a:fld id="{034BFA8B-862A-E743-A9E6-9B9C0E234B15}" type="slidenum">
               <a:rPr lang="en-US" smtClean="0"/>
-              <a:t>6</a:t>
+              <a:t>7</a:t>
             </a:fld>
             <a:endParaRPr lang="en-US"/>
           </a:p>
@@ -4234,6 +4235,219 @@
       </p:grpSpPr>
       <p:sp>
         <p:nvSpPr>
+          <p:cNvPr id="2" name="Title 1"/>
+          <p:cNvSpPr>
+            <a:spLocks noGrp="1"/>
+          </p:cNvSpPr>
+          <p:nvPr>
+            <p:ph type="title"/>
+          </p:nvPr>
+        </p:nvSpPr>
+        <p:spPr/>
+        <p:txBody>
+          <a:bodyPr/>
+          <a:lstStyle/>
+          <a:p>
+            <a:r>
+              <a:rPr lang="en-US" dirty="0"/>
+              <a:t>Tests </a:t>
+            </a:r>
+            <a:r>
+              <a:rPr lang="en-US" dirty="0" err="1"/>
+              <a:t>unitarios</a:t>
+            </a:r>
+            <a:endParaRPr lang="en-US" dirty="0"/>
+          </a:p>
+        </p:txBody>
+      </p:sp>
+      <p:sp>
+        <p:nvSpPr>
+          <p:cNvPr id="3" name="Content Placeholder 2"/>
+          <p:cNvSpPr>
+            <a:spLocks noGrp="1"/>
+          </p:cNvSpPr>
+          <p:nvPr>
+            <p:ph idx="1"/>
+          </p:nvPr>
+        </p:nvSpPr>
+        <p:spPr/>
+        <p:txBody>
+          <a:bodyPr vert="horz" lIns="91440" tIns="45720" rIns="91440" bIns="45720" rtlCol="0">
+            <a:normAutofit/>
+          </a:bodyPr>
+          <a:lstStyle/>
+          <a:p>
+            <a:r>
+              <a:rPr lang="es-AR" dirty="0" smtClean="0"/>
+              <a:t>Utilizar </a:t>
+            </a:r>
+            <a:r>
+              <a:rPr lang="es-AR" dirty="0" err="1" smtClean="0"/>
+              <a:t>tests</a:t>
+            </a:r>
+            <a:r>
+              <a:rPr lang="es-AR" dirty="0" smtClean="0"/>
+              <a:t> unitarios:</a:t>
+            </a:r>
+            <a:endParaRPr lang="es-AR" dirty="0"/>
+          </a:p>
+          <a:p>
+            <a:pPr lvl="1"/>
+            <a:r>
+              <a:rPr lang="es-AR" dirty="0" smtClean="0"/>
+              <a:t>Minimiza </a:t>
+            </a:r>
+            <a:r>
+              <a:rPr lang="es-AR" dirty="0"/>
+              <a:t>el número de errores en el producto final</a:t>
+            </a:r>
+          </a:p>
+          <a:p>
+            <a:pPr lvl="1"/>
+            <a:r>
+              <a:rPr lang="es-AR" dirty="0" smtClean="0"/>
+              <a:t>Hace </a:t>
+            </a:r>
+            <a:r>
+              <a:rPr lang="es-AR" dirty="0"/>
+              <a:t>el código más </a:t>
+            </a:r>
+            <a:r>
+              <a:rPr lang="es-AR" dirty="0" err="1"/>
+              <a:t>mantenible</a:t>
+            </a:r>
+            <a:endParaRPr lang="es-AR" dirty="0"/>
+          </a:p>
+          <a:p>
+            <a:pPr lvl="1"/>
+            <a:r>
+              <a:rPr lang="es-AR" dirty="0" smtClean="0"/>
+              <a:t>Permite </a:t>
+            </a:r>
+            <a:r>
+              <a:rPr lang="es-AR" dirty="0"/>
+              <a:t>la detección temprana de errores en el ambiente de desarrollo</a:t>
+            </a:r>
+          </a:p>
+          <a:p>
+            <a:pPr lvl="1"/>
+            <a:r>
+              <a:rPr lang="es-AR" dirty="0" smtClean="0"/>
+              <a:t>Reduce </a:t>
+            </a:r>
+            <a:r>
+              <a:rPr lang="es-AR" dirty="0"/>
+              <a:t>el tiempo de desarrollo y mantenimiento durante el ciclo de vida de un proyecto</a:t>
+            </a:r>
+          </a:p>
+          <a:p>
+            <a:pPr lvl="1"/>
+            <a:r>
+              <a:rPr lang="es-AR" dirty="0" smtClean="0"/>
+              <a:t>Permite </a:t>
+            </a:r>
+            <a:r>
+              <a:rPr lang="es-AR" dirty="0"/>
+              <a:t>generar métricas de cobertura de código</a:t>
+            </a:r>
+          </a:p>
+          <a:p>
+            <a:pPr lvl="1"/>
+            <a:r>
+              <a:rPr lang="es-AR" b="1" dirty="0" smtClean="0"/>
+              <a:t>Mejora </a:t>
+            </a:r>
+            <a:r>
+              <a:rPr lang="es-AR" b="1" dirty="0"/>
+              <a:t>la calidad del producto final</a:t>
+            </a:r>
+          </a:p>
+          <a:p>
+            <a:pPr lvl="1"/>
+            <a:endParaRPr lang="es-AR" dirty="0"/>
+          </a:p>
+        </p:txBody>
+      </p:sp>
+      <p:pic>
+        <p:nvPicPr>
+          <p:cNvPr id="4" name="Picture 2" descr="Trabajador con un megÃ¡fono"/>
+          <p:cNvPicPr>
+            <a:picLocks noChangeAspect="1" noChangeArrowheads="1"/>
+          </p:cNvPicPr>
+          <p:nvPr/>
+        </p:nvPicPr>
+        <p:blipFill>
+          <a:blip r:embed="rId2">
+            <a:extLst>
+              <a:ext uri="{28A0092B-C50C-407E-A947-70E740481C1C}">
+                <a14:useLocalDpi xmlns:a14="http://schemas.microsoft.com/office/drawing/2010/main" val="0"/>
+              </a:ext>
+            </a:extLst>
+          </a:blip>
+          <a:srcRect/>
+          <a:stretch>
+            <a:fillRect/>
+          </a:stretch>
+        </p:blipFill>
+        <p:spPr bwMode="auto">
+          <a:xfrm>
+            <a:off x="9403836" y="155814"/>
+            <a:ext cx="2580346" cy="2580346"/>
+          </a:xfrm>
+          <a:prstGeom prst="rect">
+            <a:avLst/>
+          </a:prstGeom>
+          <a:noFill/>
+          <a:extLst>
+            <a:ext uri="{909E8E84-426E-40DD-AFC4-6F175D3DCCD1}">
+              <a14:hiddenFill xmlns:a14="http://schemas.microsoft.com/office/drawing/2010/main">
+                <a:solidFill>
+                  <a:srgbClr val="FFFFFF"/>
+                </a:solidFill>
+              </a14:hiddenFill>
+            </a:ext>
+          </a:extLst>
+        </p:spPr>
+      </p:pic>
+    </p:spTree>
+    <p:extLst>
+      <p:ext uri="{BB962C8B-B14F-4D97-AF65-F5344CB8AC3E}">
+        <p14:creationId xmlns:p14="http://schemas.microsoft.com/office/powerpoint/2010/main" val="1872446243"/>
+      </p:ext>
+    </p:extLst>
+  </p:cSld>
+  <p:clrMapOvr>
+    <a:masterClrMapping/>
+  </p:clrMapOvr>
+  <p:timing>
+    <p:tnLst>
+      <p:par>
+        <p:cTn id="1" dur="indefinite" restart="never" nodeType="tmRoot"/>
+      </p:par>
+    </p:tnLst>
+  </p:timing>
+</p:sld>
+</file>
+
+<file path=ppt/slides/slide11.xml><?xml version="1.0" encoding="utf-8"?>
+<p:sld xmlns:a="http://schemas.openxmlformats.org/drawingml/2006/main" xmlns:r="http://schemas.openxmlformats.org/officeDocument/2006/relationships" xmlns:p="http://schemas.openxmlformats.org/presentationml/2006/main">
+  <p:cSld>
+    <p:spTree>
+      <p:nvGrpSpPr>
+        <p:cNvPr id="1" name=""/>
+        <p:cNvGrpSpPr/>
+        <p:nvPr/>
+      </p:nvGrpSpPr>
+      <p:grpSpPr>
+        <a:xfrm>
+          <a:off x="0" y="0"/>
+          <a:ext cx="0" cy="0"/>
+          <a:chOff x="0" y="0"/>
+          <a:chExt cx="0" cy="0"/>
+        </a:xfrm>
+      </p:grpSpPr>
+      <p:sp>
+        <p:nvSpPr>
           <p:cNvPr id="4" name="Title 3"/>
           <p:cNvSpPr>
             <a:spLocks noGrp="1"/>
@@ -4310,7 +4524,7 @@
 </p:sld>
 </file>
 
-<file path=ppt/slides/slide11.xml><?xml version="1.0" encoding="utf-8"?>
+<file path=ppt/slides/slide12.xml><?xml version="1.0" encoding="utf-8"?>
 <p:sld xmlns:a="http://schemas.openxmlformats.org/drawingml/2006/main" xmlns:r="http://schemas.openxmlformats.org/officeDocument/2006/relationships" xmlns:p="http://schemas.openxmlformats.org/presentationml/2006/main">
   <p:cSld>
     <p:spTree>
@@ -4686,7 +4900,7 @@
 </p:sld>
 </file>
 
-<file path=ppt/slides/slide12.xml><?xml version="1.0" encoding="utf-8"?>
+<file path=ppt/slides/slide13.xml><?xml version="1.0" encoding="utf-8"?>
 <p:sld xmlns:a="http://schemas.openxmlformats.org/drawingml/2006/main" xmlns:r="http://schemas.openxmlformats.org/officeDocument/2006/relationships" xmlns:p="http://schemas.openxmlformats.org/presentationml/2006/main">
   <p:cSld>
     <p:spTree>
@@ -5250,7 +5464,7 @@
 </p:sld>
 </file>
 
-<file path=ppt/slides/slide13.xml><?xml version="1.0" encoding="utf-8"?>
+<file path=ppt/slides/slide14.xml><?xml version="1.0" encoding="utf-8"?>
 <p:sld xmlns:a="http://schemas.openxmlformats.org/drawingml/2006/main" xmlns:r="http://schemas.openxmlformats.org/officeDocument/2006/relationships" xmlns:p="http://schemas.openxmlformats.org/presentationml/2006/main">
   <p:cSld>
     <p:spTree>
@@ -5740,7 +5954,7 @@
 </p:sld>
 </file>
 
-<file path=ppt/slides/slide14.xml><?xml version="1.0" encoding="utf-8"?>
+<file path=ppt/slides/slide15.xml><?xml version="1.0" encoding="utf-8"?>
 <p:sld xmlns:a="http://schemas.openxmlformats.org/drawingml/2006/main" xmlns:r="http://schemas.openxmlformats.org/officeDocument/2006/relationships" xmlns:p="http://schemas.openxmlformats.org/presentationml/2006/main">
   <p:cSld>
     <p:spTree>
@@ -6037,7 +6251,7 @@
 </p:sld>
 </file>
 
-<file path=ppt/slides/slide15.xml><?xml version="1.0" encoding="utf-8"?>
+<file path=ppt/slides/slide16.xml><?xml version="1.0" encoding="utf-8"?>
 <p:sld xmlns:a="http://schemas.openxmlformats.org/drawingml/2006/main" xmlns:r="http://schemas.openxmlformats.org/officeDocument/2006/relationships" xmlns:p="http://schemas.openxmlformats.org/presentationml/2006/main">
   <p:cSld>
     <p:spTree>
@@ -6233,7 +6447,7 @@
 </p:sld>
 </file>
 
-<file path=ppt/slides/slide16.xml><?xml version="1.0" encoding="utf-8"?>
+<file path=ppt/slides/slide17.xml><?xml version="1.0" encoding="utf-8"?>
 <p:sld xmlns:a="http://schemas.openxmlformats.org/drawingml/2006/main" xmlns:r="http://schemas.openxmlformats.org/officeDocument/2006/relationships" xmlns:p="http://schemas.openxmlformats.org/presentationml/2006/main">
   <p:cSld>
     <p:spTree>
@@ -6477,7 +6691,7 @@
 </p:sld>
 </file>
 
-<file path=ppt/slides/slide17.xml><?xml version="1.0" encoding="utf-8"?>
+<file path=ppt/slides/slide18.xml><?xml version="1.0" encoding="utf-8"?>
 <p:sld xmlns:a="http://schemas.openxmlformats.org/drawingml/2006/main" xmlns:r="http://schemas.openxmlformats.org/officeDocument/2006/relationships" xmlns:p="http://schemas.openxmlformats.org/presentationml/2006/main">
   <p:cSld>
     <p:spTree>
@@ -6887,7 +7101,7 @@
 </p:sld>
 </file>
 
-<file path=ppt/slides/slide18.xml><?xml version="1.0" encoding="utf-8"?>
+<file path=ppt/slides/slide19.xml><?xml version="1.0" encoding="utf-8"?>
 <p:sld xmlns:a="http://schemas.openxmlformats.org/drawingml/2006/main" xmlns:r="http://schemas.openxmlformats.org/officeDocument/2006/relationships" xmlns:p="http://schemas.openxmlformats.org/presentationml/2006/main">
   <p:cSld>
     <p:spTree>
@@ -7228,382 +7442,6 @@
     <p:extLst>
       <p:ext uri="{BB962C8B-B14F-4D97-AF65-F5344CB8AC3E}">
         <p14:creationId xmlns:p14="http://schemas.microsoft.com/office/powerpoint/2010/main" val="3400555455"/>
-      </p:ext>
-    </p:extLst>
-  </p:cSld>
-  <p:clrMapOvr>
-    <a:masterClrMapping/>
-  </p:clrMapOvr>
-  <p:timing>
-    <p:tnLst>
-      <p:par>
-        <p:cTn id="1" dur="indefinite" restart="never" nodeType="tmRoot"/>
-      </p:par>
-    </p:tnLst>
-  </p:timing>
-</p:sld>
-</file>
-
-<file path=ppt/slides/slide19.xml><?xml version="1.0" encoding="utf-8"?>
-<p:sld xmlns:a="http://schemas.openxmlformats.org/drawingml/2006/main" xmlns:r="http://schemas.openxmlformats.org/officeDocument/2006/relationships" xmlns:p="http://schemas.openxmlformats.org/presentationml/2006/main">
-  <p:cSld>
-    <p:spTree>
-      <p:nvGrpSpPr>
-        <p:cNvPr id="1" name=""/>
-        <p:cNvGrpSpPr/>
-        <p:nvPr/>
-      </p:nvGrpSpPr>
-      <p:grpSpPr>
-        <a:xfrm>
-          <a:off x="0" y="0"/>
-          <a:ext cx="0" cy="0"/>
-          <a:chOff x="0" y="0"/>
-          <a:chExt cx="0" cy="0"/>
-        </a:xfrm>
-      </p:grpSpPr>
-      <p:sp>
-        <p:nvSpPr>
-          <p:cNvPr id="2" name="Title 1"/>
-          <p:cNvSpPr>
-            <a:spLocks noGrp="1"/>
-          </p:cNvSpPr>
-          <p:nvPr>
-            <p:ph type="title"/>
-          </p:nvPr>
-        </p:nvSpPr>
-        <p:spPr/>
-        <p:txBody>
-          <a:bodyPr>
-            <a:normAutofit/>
-          </a:bodyPr>
-          <a:lstStyle/>
-          <a:p>
-            <a:r>
-              <a:rPr lang="en-US" dirty="0"/>
-              <a:t>Tip 7: Wrappers para </a:t>
-            </a:r>
-            <a:r>
-              <a:rPr lang="en-US" dirty="0" err="1"/>
-              <a:t>encapsular</a:t>
-            </a:r>
-            <a:r>
-              <a:rPr lang="en-US" dirty="0"/>
-              <a:t> </a:t>
-            </a:r>
-            <a:r>
-              <a:rPr lang="en-US" dirty="0" err="1"/>
-              <a:t>dependencias</a:t>
-            </a:r>
-            <a:r>
-              <a:rPr lang="en-US" dirty="0"/>
-              <a:t> </a:t>
-            </a:r>
-            <a:r>
-              <a:rPr lang="en-US" dirty="0" err="1" smtClean="0"/>
-              <a:t>estáticas</a:t>
-            </a:r>
-            <a:endParaRPr lang="en-US" dirty="0"/>
-          </a:p>
-        </p:txBody>
-      </p:sp>
-      <p:sp>
-        <p:nvSpPr>
-          <p:cNvPr id="3" name="Content Placeholder 2"/>
-          <p:cNvSpPr>
-            <a:spLocks noGrp="1"/>
-          </p:cNvSpPr>
-          <p:nvPr>
-            <p:ph idx="1"/>
-          </p:nvPr>
-        </p:nvSpPr>
-        <p:spPr/>
-        <p:txBody>
-          <a:bodyPr vert="horz" lIns="91440" tIns="45720" rIns="91440" bIns="45720" rtlCol="0">
-            <a:normAutofit/>
-          </a:bodyPr>
-          <a:lstStyle/>
-          <a:p>
-            <a:pPr lvl="1"/>
-            <a:r>
-              <a:rPr lang="en-GB" dirty="0" err="1"/>
-              <a:t>Evitan</a:t>
-            </a:r>
-            <a:r>
-              <a:rPr lang="en-GB" dirty="0"/>
-              <a:t> </a:t>
-            </a:r>
-            <a:r>
-              <a:rPr lang="en-GB" dirty="0" err="1"/>
-              <a:t>acoplar</a:t>
-            </a:r>
-            <a:r>
-              <a:rPr lang="en-GB" dirty="0"/>
-              <a:t> el </a:t>
-            </a:r>
-            <a:r>
-              <a:rPr lang="en-GB" dirty="0" err="1"/>
-              <a:t>código</a:t>
-            </a:r>
-            <a:r>
-              <a:rPr lang="en-GB" dirty="0"/>
-              <a:t> </a:t>
-            </a:r>
-            <a:r>
-              <a:rPr lang="en-GB" dirty="0" err="1"/>
-              <a:t>directamente</a:t>
-            </a:r>
-            <a:r>
-              <a:rPr lang="en-GB" dirty="0"/>
-              <a:t> a </a:t>
-            </a:r>
-            <a:r>
-              <a:rPr lang="en-GB" dirty="0" err="1"/>
-              <a:t>librerías</a:t>
-            </a:r>
-            <a:r>
-              <a:rPr lang="en-GB" dirty="0"/>
-              <a:t> de </a:t>
-            </a:r>
-            <a:r>
-              <a:rPr lang="en-GB" dirty="0" err="1"/>
-              <a:t>terceros</a:t>
-            </a:r>
-            <a:endParaRPr lang="en-GB" dirty="0"/>
-          </a:p>
-          <a:p>
-            <a:pPr lvl="1"/>
-            <a:r>
-              <a:rPr lang="en-GB" dirty="0"/>
-              <a:t>Se </a:t>
-            </a:r>
-            <a:r>
-              <a:rPr lang="en-GB" dirty="0" err="1"/>
-              <a:t>puede</a:t>
-            </a:r>
-            <a:r>
-              <a:rPr lang="en-GB" dirty="0"/>
-              <a:t> </a:t>
-            </a:r>
-            <a:r>
-              <a:rPr lang="en-GB" dirty="0" err="1"/>
-              <a:t>cambiar</a:t>
-            </a:r>
-            <a:r>
-              <a:rPr lang="en-GB" dirty="0"/>
-              <a:t> de </a:t>
-            </a:r>
-            <a:r>
-              <a:rPr lang="en-GB" dirty="0" err="1"/>
-              <a:t>librería</a:t>
-            </a:r>
-            <a:r>
-              <a:rPr lang="en-GB" dirty="0"/>
-              <a:t> de </a:t>
-            </a:r>
-            <a:r>
-              <a:rPr lang="en-GB" dirty="0" err="1"/>
-              <a:t>terceros</a:t>
-            </a:r>
-            <a:r>
-              <a:rPr lang="en-GB" dirty="0"/>
-              <a:t> sin </a:t>
-            </a:r>
-            <a:r>
-              <a:rPr lang="en-GB" dirty="0" err="1"/>
-              <a:t>cambiar</a:t>
-            </a:r>
-            <a:r>
-              <a:rPr lang="en-GB" dirty="0"/>
-              <a:t> el </a:t>
-            </a:r>
-            <a:r>
-              <a:rPr lang="en-GB" dirty="0" err="1"/>
-              <a:t>código</a:t>
-            </a:r>
-            <a:r>
-              <a:rPr lang="en-GB" dirty="0"/>
-              <a:t> de la </a:t>
-            </a:r>
-            <a:r>
-              <a:rPr lang="en-GB" dirty="0" err="1"/>
-              <a:t>aplicación</a:t>
-            </a:r>
-            <a:endParaRPr lang="en-GB" dirty="0"/>
-          </a:p>
-          <a:p>
-            <a:pPr lvl="1"/>
-            <a:r>
-              <a:rPr lang="en-GB" dirty="0" err="1"/>
-              <a:t>Permiten</a:t>
-            </a:r>
-            <a:r>
-              <a:rPr lang="en-GB" dirty="0"/>
-              <a:t> </a:t>
-            </a:r>
-            <a:r>
-              <a:rPr lang="en-GB" dirty="0" err="1"/>
-              <a:t>usar</a:t>
-            </a:r>
-            <a:r>
-              <a:rPr lang="en-GB" dirty="0"/>
-              <a:t> mocks de </a:t>
-            </a:r>
-            <a:r>
-              <a:rPr lang="en-GB" dirty="0" err="1"/>
-              <a:t>dependencias</a:t>
-            </a:r>
-            <a:r>
-              <a:rPr lang="en-GB" dirty="0"/>
-              <a:t> </a:t>
-            </a:r>
-            <a:r>
-              <a:rPr lang="en-GB" dirty="0" err="1"/>
-              <a:t>estáticas</a:t>
-            </a:r>
-            <a:r>
-              <a:rPr lang="en-GB" dirty="0"/>
-              <a:t> de </a:t>
-            </a:r>
-            <a:r>
-              <a:rPr lang="en-GB" dirty="0" err="1"/>
-              <a:t>terceros</a:t>
-            </a:r>
-            <a:endParaRPr lang="en-GB" dirty="0"/>
-          </a:p>
-          <a:p>
-            <a:pPr lvl="1"/>
-            <a:r>
-              <a:rPr lang="en-GB" dirty="0" err="1"/>
-              <a:t>Evitan</a:t>
-            </a:r>
-            <a:r>
-              <a:rPr lang="en-GB" dirty="0"/>
-              <a:t> el </a:t>
-            </a:r>
-            <a:r>
-              <a:rPr lang="en-GB" dirty="0" err="1"/>
-              <a:t>uso</a:t>
-            </a:r>
-            <a:r>
-              <a:rPr lang="en-GB" dirty="0"/>
-              <a:t> de </a:t>
-            </a:r>
-            <a:r>
-              <a:rPr lang="en-GB" dirty="0" err="1"/>
-              <a:t>clases</a:t>
-            </a:r>
-            <a:r>
-              <a:rPr lang="en-GB" dirty="0"/>
-              <a:t> </a:t>
-            </a:r>
-            <a:r>
-              <a:rPr lang="en-GB" dirty="0" err="1"/>
-              <a:t>específicas</a:t>
-            </a:r>
-            <a:r>
-              <a:rPr lang="en-GB" dirty="0"/>
-              <a:t> de </a:t>
-            </a:r>
-            <a:r>
-              <a:rPr lang="en-GB" dirty="0" err="1"/>
-              <a:t>librerías</a:t>
-            </a:r>
-            <a:r>
-              <a:rPr lang="en-GB" dirty="0"/>
-              <a:t> de </a:t>
-            </a:r>
-            <a:r>
-              <a:rPr lang="en-GB" dirty="0" err="1"/>
-              <a:t>terceros</a:t>
-            </a:r>
-            <a:r>
-              <a:rPr lang="en-GB" dirty="0"/>
-              <a:t> </a:t>
-            </a:r>
-            <a:r>
-              <a:rPr lang="en-GB" dirty="0" err="1"/>
-              <a:t>en</a:t>
-            </a:r>
-            <a:r>
-              <a:rPr lang="en-GB" dirty="0"/>
-              <a:t> </a:t>
-            </a:r>
-            <a:r>
-              <a:rPr lang="en-GB" dirty="0" err="1"/>
-              <a:t>tu</a:t>
-            </a:r>
-            <a:r>
-              <a:rPr lang="en-GB" dirty="0"/>
-              <a:t> </a:t>
-            </a:r>
-            <a:r>
-              <a:rPr lang="en-GB" dirty="0" err="1"/>
-              <a:t>código</a:t>
-            </a:r>
-            <a:endParaRPr lang="en-GB" dirty="0"/>
-          </a:p>
-          <a:p>
-            <a:pPr lvl="1"/>
-            <a:r>
-              <a:rPr lang="en-GB" dirty="0"/>
-              <a:t>No </a:t>
-            </a:r>
-            <a:r>
-              <a:rPr lang="en-GB" dirty="0" err="1"/>
-              <a:t>siempre</a:t>
-            </a:r>
-            <a:r>
-              <a:rPr lang="en-GB" dirty="0"/>
-              <a:t> </a:t>
-            </a:r>
-            <a:r>
-              <a:rPr lang="en-GB" dirty="0" err="1"/>
-              <a:t>es</a:t>
-            </a:r>
-            <a:r>
-              <a:rPr lang="en-GB" dirty="0"/>
-              <a:t> </a:t>
-            </a:r>
-            <a:r>
-              <a:rPr lang="en-GB" dirty="0" err="1"/>
-              <a:t>necesario</a:t>
-            </a:r>
-            <a:r>
-              <a:rPr lang="en-GB" dirty="0"/>
-              <a:t> </a:t>
-            </a:r>
-            <a:r>
-              <a:rPr lang="en-GB" dirty="0" err="1"/>
-              <a:t>usar</a:t>
-            </a:r>
-            <a:r>
-              <a:rPr lang="en-GB" dirty="0"/>
-              <a:t> wrappers para </a:t>
-            </a:r>
-            <a:r>
-              <a:rPr lang="en-GB" dirty="0" err="1"/>
-              <a:t>dependencias</a:t>
-            </a:r>
-            <a:r>
-              <a:rPr lang="en-GB" dirty="0"/>
-              <a:t> de </a:t>
-            </a:r>
-            <a:r>
-              <a:rPr lang="en-GB" dirty="0" err="1"/>
-              <a:t>terceros</a:t>
-            </a:r>
-            <a:endParaRPr lang="es-AR" dirty="0"/>
-          </a:p>
-          <a:p>
-            <a:pPr lvl="1"/>
-            <a:endParaRPr lang="es-AR" dirty="0"/>
-          </a:p>
-        </p:txBody>
-      </p:sp>
-    </p:spTree>
-    <p:extLst>
-      <p:ext uri="{BB962C8B-B14F-4D97-AF65-F5344CB8AC3E}">
-        <p14:creationId xmlns:p14="http://schemas.microsoft.com/office/powerpoint/2010/main" val="3438304941"/>
       </p:ext>
     </p:extLst>
   </p:cSld>
@@ -7786,6 +7624,382 @@
       </p:grpSpPr>
       <p:sp>
         <p:nvSpPr>
+          <p:cNvPr id="2" name="Title 1"/>
+          <p:cNvSpPr>
+            <a:spLocks noGrp="1"/>
+          </p:cNvSpPr>
+          <p:nvPr>
+            <p:ph type="title"/>
+          </p:nvPr>
+        </p:nvSpPr>
+        <p:spPr/>
+        <p:txBody>
+          <a:bodyPr>
+            <a:normAutofit/>
+          </a:bodyPr>
+          <a:lstStyle/>
+          <a:p>
+            <a:r>
+              <a:rPr lang="en-US" dirty="0"/>
+              <a:t>Tip 7: Wrappers para </a:t>
+            </a:r>
+            <a:r>
+              <a:rPr lang="en-US" dirty="0" err="1"/>
+              <a:t>encapsular</a:t>
+            </a:r>
+            <a:r>
+              <a:rPr lang="en-US" dirty="0"/>
+              <a:t> </a:t>
+            </a:r>
+            <a:r>
+              <a:rPr lang="en-US" dirty="0" err="1"/>
+              <a:t>dependencias</a:t>
+            </a:r>
+            <a:r>
+              <a:rPr lang="en-US" dirty="0"/>
+              <a:t> </a:t>
+            </a:r>
+            <a:r>
+              <a:rPr lang="en-US" dirty="0" err="1" smtClean="0"/>
+              <a:t>estáticas</a:t>
+            </a:r>
+            <a:endParaRPr lang="en-US" dirty="0"/>
+          </a:p>
+        </p:txBody>
+      </p:sp>
+      <p:sp>
+        <p:nvSpPr>
+          <p:cNvPr id="3" name="Content Placeholder 2"/>
+          <p:cNvSpPr>
+            <a:spLocks noGrp="1"/>
+          </p:cNvSpPr>
+          <p:nvPr>
+            <p:ph idx="1"/>
+          </p:nvPr>
+        </p:nvSpPr>
+        <p:spPr/>
+        <p:txBody>
+          <a:bodyPr vert="horz" lIns="91440" tIns="45720" rIns="91440" bIns="45720" rtlCol="0">
+            <a:normAutofit/>
+          </a:bodyPr>
+          <a:lstStyle/>
+          <a:p>
+            <a:pPr lvl="1"/>
+            <a:r>
+              <a:rPr lang="en-GB" dirty="0" err="1"/>
+              <a:t>Evitan</a:t>
+            </a:r>
+            <a:r>
+              <a:rPr lang="en-GB" dirty="0"/>
+              <a:t> </a:t>
+            </a:r>
+            <a:r>
+              <a:rPr lang="en-GB" dirty="0" err="1"/>
+              <a:t>acoplar</a:t>
+            </a:r>
+            <a:r>
+              <a:rPr lang="en-GB" dirty="0"/>
+              <a:t> el </a:t>
+            </a:r>
+            <a:r>
+              <a:rPr lang="en-GB" dirty="0" err="1"/>
+              <a:t>código</a:t>
+            </a:r>
+            <a:r>
+              <a:rPr lang="en-GB" dirty="0"/>
+              <a:t> </a:t>
+            </a:r>
+            <a:r>
+              <a:rPr lang="en-GB" dirty="0" err="1"/>
+              <a:t>directamente</a:t>
+            </a:r>
+            <a:r>
+              <a:rPr lang="en-GB" dirty="0"/>
+              <a:t> a </a:t>
+            </a:r>
+            <a:r>
+              <a:rPr lang="en-GB" dirty="0" err="1"/>
+              <a:t>librerías</a:t>
+            </a:r>
+            <a:r>
+              <a:rPr lang="en-GB" dirty="0"/>
+              <a:t> de </a:t>
+            </a:r>
+            <a:r>
+              <a:rPr lang="en-GB" dirty="0" err="1"/>
+              <a:t>terceros</a:t>
+            </a:r>
+            <a:endParaRPr lang="en-GB" dirty="0"/>
+          </a:p>
+          <a:p>
+            <a:pPr lvl="1"/>
+            <a:r>
+              <a:rPr lang="en-GB" dirty="0"/>
+              <a:t>Se </a:t>
+            </a:r>
+            <a:r>
+              <a:rPr lang="en-GB" dirty="0" err="1"/>
+              <a:t>puede</a:t>
+            </a:r>
+            <a:r>
+              <a:rPr lang="en-GB" dirty="0"/>
+              <a:t> </a:t>
+            </a:r>
+            <a:r>
+              <a:rPr lang="en-GB" dirty="0" err="1"/>
+              <a:t>cambiar</a:t>
+            </a:r>
+            <a:r>
+              <a:rPr lang="en-GB" dirty="0"/>
+              <a:t> de </a:t>
+            </a:r>
+            <a:r>
+              <a:rPr lang="en-GB" dirty="0" err="1"/>
+              <a:t>librería</a:t>
+            </a:r>
+            <a:r>
+              <a:rPr lang="en-GB" dirty="0"/>
+              <a:t> de </a:t>
+            </a:r>
+            <a:r>
+              <a:rPr lang="en-GB" dirty="0" err="1"/>
+              <a:t>terceros</a:t>
+            </a:r>
+            <a:r>
+              <a:rPr lang="en-GB" dirty="0"/>
+              <a:t> sin </a:t>
+            </a:r>
+            <a:r>
+              <a:rPr lang="en-GB" dirty="0" err="1"/>
+              <a:t>cambiar</a:t>
+            </a:r>
+            <a:r>
+              <a:rPr lang="en-GB" dirty="0"/>
+              <a:t> el </a:t>
+            </a:r>
+            <a:r>
+              <a:rPr lang="en-GB" dirty="0" err="1"/>
+              <a:t>código</a:t>
+            </a:r>
+            <a:r>
+              <a:rPr lang="en-GB" dirty="0"/>
+              <a:t> de la </a:t>
+            </a:r>
+            <a:r>
+              <a:rPr lang="en-GB" dirty="0" err="1"/>
+              <a:t>aplicación</a:t>
+            </a:r>
+            <a:endParaRPr lang="en-GB" dirty="0"/>
+          </a:p>
+          <a:p>
+            <a:pPr lvl="1"/>
+            <a:r>
+              <a:rPr lang="en-GB" dirty="0" err="1"/>
+              <a:t>Permiten</a:t>
+            </a:r>
+            <a:r>
+              <a:rPr lang="en-GB" dirty="0"/>
+              <a:t> </a:t>
+            </a:r>
+            <a:r>
+              <a:rPr lang="en-GB" dirty="0" err="1"/>
+              <a:t>usar</a:t>
+            </a:r>
+            <a:r>
+              <a:rPr lang="en-GB" dirty="0"/>
+              <a:t> mocks de </a:t>
+            </a:r>
+            <a:r>
+              <a:rPr lang="en-GB" dirty="0" err="1"/>
+              <a:t>dependencias</a:t>
+            </a:r>
+            <a:r>
+              <a:rPr lang="en-GB" dirty="0"/>
+              <a:t> </a:t>
+            </a:r>
+            <a:r>
+              <a:rPr lang="en-GB" dirty="0" err="1"/>
+              <a:t>estáticas</a:t>
+            </a:r>
+            <a:r>
+              <a:rPr lang="en-GB" dirty="0"/>
+              <a:t> de </a:t>
+            </a:r>
+            <a:r>
+              <a:rPr lang="en-GB" dirty="0" err="1"/>
+              <a:t>terceros</a:t>
+            </a:r>
+            <a:endParaRPr lang="en-GB" dirty="0"/>
+          </a:p>
+          <a:p>
+            <a:pPr lvl="1"/>
+            <a:r>
+              <a:rPr lang="en-GB" dirty="0" err="1"/>
+              <a:t>Evitan</a:t>
+            </a:r>
+            <a:r>
+              <a:rPr lang="en-GB" dirty="0"/>
+              <a:t> el </a:t>
+            </a:r>
+            <a:r>
+              <a:rPr lang="en-GB" dirty="0" err="1"/>
+              <a:t>uso</a:t>
+            </a:r>
+            <a:r>
+              <a:rPr lang="en-GB" dirty="0"/>
+              <a:t> de </a:t>
+            </a:r>
+            <a:r>
+              <a:rPr lang="en-GB" dirty="0" err="1"/>
+              <a:t>clases</a:t>
+            </a:r>
+            <a:r>
+              <a:rPr lang="en-GB" dirty="0"/>
+              <a:t> </a:t>
+            </a:r>
+            <a:r>
+              <a:rPr lang="en-GB" dirty="0" err="1"/>
+              <a:t>específicas</a:t>
+            </a:r>
+            <a:r>
+              <a:rPr lang="en-GB" dirty="0"/>
+              <a:t> de </a:t>
+            </a:r>
+            <a:r>
+              <a:rPr lang="en-GB" dirty="0" err="1"/>
+              <a:t>librerías</a:t>
+            </a:r>
+            <a:r>
+              <a:rPr lang="en-GB" dirty="0"/>
+              <a:t> de </a:t>
+            </a:r>
+            <a:r>
+              <a:rPr lang="en-GB" dirty="0" err="1"/>
+              <a:t>terceros</a:t>
+            </a:r>
+            <a:r>
+              <a:rPr lang="en-GB" dirty="0"/>
+              <a:t> </a:t>
+            </a:r>
+            <a:r>
+              <a:rPr lang="en-GB" dirty="0" err="1"/>
+              <a:t>en</a:t>
+            </a:r>
+            <a:r>
+              <a:rPr lang="en-GB" dirty="0"/>
+              <a:t> </a:t>
+            </a:r>
+            <a:r>
+              <a:rPr lang="en-GB" dirty="0" err="1"/>
+              <a:t>tu</a:t>
+            </a:r>
+            <a:r>
+              <a:rPr lang="en-GB" dirty="0"/>
+              <a:t> </a:t>
+            </a:r>
+            <a:r>
+              <a:rPr lang="en-GB" dirty="0" err="1"/>
+              <a:t>código</a:t>
+            </a:r>
+            <a:endParaRPr lang="en-GB" dirty="0"/>
+          </a:p>
+          <a:p>
+            <a:pPr lvl="1"/>
+            <a:r>
+              <a:rPr lang="en-GB" dirty="0"/>
+              <a:t>No </a:t>
+            </a:r>
+            <a:r>
+              <a:rPr lang="en-GB" dirty="0" err="1"/>
+              <a:t>siempre</a:t>
+            </a:r>
+            <a:r>
+              <a:rPr lang="en-GB" dirty="0"/>
+              <a:t> </a:t>
+            </a:r>
+            <a:r>
+              <a:rPr lang="en-GB" dirty="0" err="1"/>
+              <a:t>es</a:t>
+            </a:r>
+            <a:r>
+              <a:rPr lang="en-GB" dirty="0"/>
+              <a:t> </a:t>
+            </a:r>
+            <a:r>
+              <a:rPr lang="en-GB" dirty="0" err="1"/>
+              <a:t>necesario</a:t>
+            </a:r>
+            <a:r>
+              <a:rPr lang="en-GB" dirty="0"/>
+              <a:t> </a:t>
+            </a:r>
+            <a:r>
+              <a:rPr lang="en-GB" dirty="0" err="1"/>
+              <a:t>usar</a:t>
+            </a:r>
+            <a:r>
+              <a:rPr lang="en-GB" dirty="0"/>
+              <a:t> wrappers para </a:t>
+            </a:r>
+            <a:r>
+              <a:rPr lang="en-GB" dirty="0" err="1"/>
+              <a:t>dependencias</a:t>
+            </a:r>
+            <a:r>
+              <a:rPr lang="en-GB" dirty="0"/>
+              <a:t> de </a:t>
+            </a:r>
+            <a:r>
+              <a:rPr lang="en-GB" dirty="0" err="1"/>
+              <a:t>terceros</a:t>
+            </a:r>
+            <a:endParaRPr lang="es-AR" dirty="0"/>
+          </a:p>
+          <a:p>
+            <a:pPr lvl="1"/>
+            <a:endParaRPr lang="es-AR" dirty="0"/>
+          </a:p>
+        </p:txBody>
+      </p:sp>
+    </p:spTree>
+    <p:extLst>
+      <p:ext uri="{BB962C8B-B14F-4D97-AF65-F5344CB8AC3E}">
+        <p14:creationId xmlns:p14="http://schemas.microsoft.com/office/powerpoint/2010/main" val="3438304941"/>
+      </p:ext>
+    </p:extLst>
+  </p:cSld>
+  <p:clrMapOvr>
+    <a:masterClrMapping/>
+  </p:clrMapOvr>
+  <p:timing>
+    <p:tnLst>
+      <p:par>
+        <p:cTn id="1" dur="indefinite" restart="never" nodeType="tmRoot"/>
+      </p:par>
+    </p:tnLst>
+  </p:timing>
+</p:sld>
+</file>
+
+<file path=ppt/slides/slide21.xml><?xml version="1.0" encoding="utf-8"?>
+<p:sld xmlns:a="http://schemas.openxmlformats.org/drawingml/2006/main" xmlns:r="http://schemas.openxmlformats.org/officeDocument/2006/relationships" xmlns:p="http://schemas.openxmlformats.org/presentationml/2006/main">
+  <p:cSld>
+    <p:spTree>
+      <p:nvGrpSpPr>
+        <p:cNvPr id="1" name=""/>
+        <p:cNvGrpSpPr/>
+        <p:nvPr/>
+      </p:nvGrpSpPr>
+      <p:grpSpPr>
+        <a:xfrm>
+          <a:off x="0" y="0"/>
+          <a:ext cx="0" cy="0"/>
+          <a:chOff x="0" y="0"/>
+          <a:chExt cx="0" cy="0"/>
+        </a:xfrm>
+      </p:grpSpPr>
+      <p:sp>
+        <p:nvSpPr>
           <p:cNvPr id="4" name="Title 3"/>
           <p:cNvSpPr>
             <a:spLocks noGrp="1"/>
@@ -7884,7 +8098,7 @@
 </p:sld>
 </file>
 
-<file path=ppt/slides/slide21.xml><?xml version="1.0" encoding="utf-8"?>
+<file path=ppt/slides/slide22.xml><?xml version="1.0" encoding="utf-8"?>
 <p:sld xmlns:a="http://schemas.openxmlformats.org/drawingml/2006/main" xmlns:r="http://schemas.openxmlformats.org/officeDocument/2006/relationships" xmlns:p="http://schemas.openxmlformats.org/presentationml/2006/main">
   <p:cSld>
     <p:spTree>
@@ -8078,7 +8292,7 @@
 </p:sld>
 </file>
 
-<file path=ppt/slides/slide22.xml><?xml version="1.0" encoding="utf-8"?>
+<file path=ppt/slides/slide23.xml><?xml version="1.0" encoding="utf-8"?>
 <p:sld xmlns:a="http://schemas.openxmlformats.org/drawingml/2006/main" xmlns:r="http://schemas.openxmlformats.org/officeDocument/2006/relationships" xmlns:p="http://schemas.openxmlformats.org/presentationml/2006/main">
   <p:cSld>
     <p:spTree>
@@ -8270,182 +8484,6 @@
 </p:sld>
 </file>
 
-<file path=ppt/slides/slide23.xml><?xml version="1.0" encoding="utf-8"?>
-<p:sld xmlns:a="http://schemas.openxmlformats.org/drawingml/2006/main" xmlns:r="http://schemas.openxmlformats.org/officeDocument/2006/relationships" xmlns:p="http://schemas.openxmlformats.org/presentationml/2006/main">
-  <p:cSld>
-    <p:spTree>
-      <p:nvGrpSpPr>
-        <p:cNvPr id="1" name=""/>
-        <p:cNvGrpSpPr/>
-        <p:nvPr/>
-      </p:nvGrpSpPr>
-      <p:grpSpPr>
-        <a:xfrm>
-          <a:off x="0" y="0"/>
-          <a:ext cx="0" cy="0"/>
-          <a:chOff x="0" y="0"/>
-          <a:chExt cx="0" cy="0"/>
-        </a:xfrm>
-      </p:grpSpPr>
-      <p:sp>
-        <p:nvSpPr>
-          <p:cNvPr id="2" name="Title 1"/>
-          <p:cNvSpPr>
-            <a:spLocks noGrp="1"/>
-          </p:cNvSpPr>
-          <p:nvPr>
-            <p:ph type="title"/>
-          </p:nvPr>
-        </p:nvSpPr>
-        <p:spPr/>
-        <p:txBody>
-          <a:bodyPr/>
-          <a:lstStyle/>
-          <a:p>
-            <a:r>
-              <a:rPr lang="en-US" dirty="0"/>
-              <a:t>Tip </a:t>
-            </a:r>
-            <a:r>
-              <a:rPr lang="en-US" dirty="0" smtClean="0"/>
-              <a:t>1: </a:t>
-            </a:r>
-            <a:r>
-              <a:rPr lang="en-US" dirty="0" err="1"/>
-              <a:t>Desacoplar</a:t>
-            </a:r>
-            <a:r>
-              <a:rPr lang="en-US" dirty="0"/>
-              <a:t> </a:t>
-            </a:r>
-            <a:r>
-              <a:rPr lang="en-US" dirty="0" err="1"/>
-              <a:t>dependencias</a:t>
-            </a:r>
-            <a:r>
-              <a:rPr lang="en-US" dirty="0"/>
-              <a:t> del </a:t>
-            </a:r>
-            <a:r>
-              <a:rPr lang="en-US" dirty="0" err="1"/>
-              <a:t>método</a:t>
-            </a:r>
-            <a:endParaRPr lang="en-US" dirty="0"/>
-          </a:p>
-        </p:txBody>
-      </p:sp>
-      <p:sp>
-        <p:nvSpPr>
-          <p:cNvPr id="3" name="Content Placeholder 2"/>
-          <p:cNvSpPr>
-            <a:spLocks noGrp="1"/>
-          </p:cNvSpPr>
-          <p:nvPr>
-            <p:ph idx="1"/>
-          </p:nvPr>
-        </p:nvSpPr>
-        <p:spPr/>
-        <p:txBody>
-          <a:bodyPr vert="horz" lIns="91440" tIns="45720" rIns="91440" bIns="45720" rtlCol="0">
-            <a:normAutofit/>
-          </a:bodyPr>
-          <a:lstStyle/>
-          <a:p>
-            <a:r>
-              <a:rPr lang="es-AR" altLang="es-AR" dirty="0"/>
-              <a:t>Extraer implementaciones concretas a interfaces</a:t>
-            </a:r>
-          </a:p>
-          <a:p>
-            <a:pPr lvl="1"/>
-            <a:r>
-              <a:rPr lang="es-AR" altLang="es-AR" dirty="0" err="1"/>
-              <a:t>Tip</a:t>
-            </a:r>
-            <a:r>
-              <a:rPr lang="es-AR" altLang="es-AR" dirty="0"/>
-              <a:t> 1: Programación orientada a interfaces</a:t>
-            </a:r>
-          </a:p>
-          <a:p>
-            <a:pPr lvl="1"/>
-            <a:r>
-              <a:rPr lang="es-AR" altLang="es-AR" dirty="0" err="1"/>
-              <a:t>Tip</a:t>
-            </a:r>
-            <a:r>
-              <a:rPr lang="es-AR" altLang="es-AR" dirty="0"/>
-              <a:t> 2: Inyección de dependencias por constructor</a:t>
-            </a:r>
-          </a:p>
-          <a:p>
-            <a:pPr lvl="1"/>
-            <a:r>
-              <a:rPr lang="es-AR" altLang="es-AR" dirty="0"/>
-              <a:t>Permite usar </a:t>
-            </a:r>
-            <a:r>
-              <a:rPr lang="es-AR" altLang="es-AR" dirty="0" err="1"/>
-              <a:t>mocks</a:t>
-            </a:r>
-            <a:r>
-              <a:rPr lang="es-AR" altLang="es-AR" dirty="0"/>
-              <a:t> de dependencias para </a:t>
-            </a:r>
-            <a:r>
-              <a:rPr lang="es-AR" altLang="es-AR" dirty="0" err="1"/>
-              <a:t>tests</a:t>
-            </a:r>
-            <a:r>
-              <a:rPr lang="es-AR" altLang="es-AR" dirty="0"/>
-              <a:t> unitarios</a:t>
-            </a:r>
-          </a:p>
-          <a:p>
-            <a:r>
-              <a:rPr lang="es-AR" altLang="es-AR" dirty="0"/>
-              <a:t>Cuidado con dependencias ocultas</a:t>
-            </a:r>
-          </a:p>
-          <a:p>
-            <a:pPr lvl="1"/>
-            <a:r>
-              <a:rPr lang="es-AR" altLang="es-AR" dirty="0"/>
-              <a:t>Ej. El constructor crea una instancia de otra clase</a:t>
-            </a:r>
-          </a:p>
-          <a:p>
-            <a:r>
-              <a:rPr lang="es-AR" altLang="es-AR" dirty="0"/>
-              <a:t>Cuando se agregan constructores para inyección de dependencias, mantener un constructor sin parámetros para evitar modificar el código existente</a:t>
-            </a:r>
-          </a:p>
-          <a:p>
-            <a:pPr lvl="1"/>
-            <a:endParaRPr lang="es-AR" dirty="0"/>
-          </a:p>
-        </p:txBody>
-      </p:sp>
-    </p:spTree>
-    <p:extLst>
-      <p:ext uri="{BB962C8B-B14F-4D97-AF65-F5344CB8AC3E}">
-        <p14:creationId xmlns:p14="http://schemas.microsoft.com/office/powerpoint/2010/main" val="3742598420"/>
-      </p:ext>
-    </p:extLst>
-  </p:cSld>
-  <p:clrMapOvr>
-    <a:masterClrMapping/>
-  </p:clrMapOvr>
-  <p:timing>
-    <p:tnLst>
-      <p:par>
-        <p:cTn id="1" dur="indefinite" restart="never" nodeType="tmRoot"/>
-      </p:par>
-    </p:tnLst>
-  </p:timing>
-</p:sld>
-</file>
-
 <file path=ppt/slides/slide24.xml><?xml version="1.0" encoding="utf-8"?>
 <p:sld xmlns:a="http://schemas.openxmlformats.org/drawingml/2006/main" xmlns:r="http://schemas.openxmlformats.org/officeDocument/2006/relationships" xmlns:p="http://schemas.openxmlformats.org/presentationml/2006/main">
   <p:cSld>
@@ -8480,7 +8518,11 @@
           <a:p>
             <a:r>
               <a:rPr lang="en-US" dirty="0"/>
-              <a:t>Tip 1: </a:t>
+              <a:t>Tip </a:t>
+            </a:r>
+            <a:r>
+              <a:rPr lang="en-US" dirty="0" smtClean="0"/>
+              <a:t>1: </a:t>
             </a:r>
             <a:r>
               <a:rPr lang="en-US" dirty="0" err="1"/>
@@ -8499,7 +8541,7 @@
               <a:t> del </a:t>
             </a:r>
             <a:r>
-              <a:rPr lang="en-US" dirty="0" err="1" smtClean="0"/>
+              <a:rPr lang="en-US" dirty="0" err="1"/>
               <a:t>método</a:t>
             </a:r>
             <a:endParaRPr lang="en-US" dirty="0"/>
@@ -8525,126 +8567,75 @@
           <a:p>
             <a:r>
               <a:rPr lang="es-AR" altLang="es-AR" dirty="0"/>
-              <a:t>Utilizar </a:t>
-            </a:r>
+              <a:t>Extraer implementaciones concretas a interfaces</a:t>
+            </a:r>
+          </a:p>
+          <a:p>
+            <a:pPr lvl="1"/>
             <a:r>
               <a:rPr lang="es-AR" altLang="es-AR" dirty="0" err="1"/>
-              <a:t>wrappers</a:t>
+              <a:t>Tip</a:t>
             </a:r>
             <a:r>
               <a:rPr lang="es-AR" altLang="es-AR" dirty="0"/>
-              <a:t> para desacoplar el código de librerías de terceros que no podemos instanciar</a:t>
+              <a:t> 1: Programación orientada a interfaces</a:t>
             </a:r>
           </a:p>
           <a:p>
             <a:pPr lvl="1"/>
             <a:r>
-              <a:rPr lang="en-US" dirty="0"/>
-              <a:t>Tip 7: Wrappers para </a:t>
-            </a:r>
-            <a:r>
-              <a:rPr lang="en-US" dirty="0" err="1"/>
-              <a:t>encapsular</a:t>
-            </a:r>
-            <a:r>
-              <a:rPr lang="en-US" dirty="0"/>
-              <a:t> </a:t>
-            </a:r>
-            <a:r>
-              <a:rPr lang="en-US" dirty="0" err="1"/>
-              <a:t>dependencias</a:t>
-            </a:r>
-            <a:r>
-              <a:rPr lang="en-US" dirty="0"/>
-              <a:t> </a:t>
-            </a:r>
-            <a:r>
-              <a:rPr lang="en-US" dirty="0" err="1"/>
-              <a:t>estáticas</a:t>
-            </a:r>
-            <a:endParaRPr lang="en-US" dirty="0"/>
-          </a:p>
-          <a:p>
-            <a:r>
-              <a:rPr lang="es-AR" dirty="0"/>
-              <a:t>Tener en mente las buenas prácticas para escribir código </a:t>
-            </a:r>
-            <a:r>
-              <a:rPr lang="es-AR" dirty="0" err="1"/>
-              <a:t>testeable</a:t>
-            </a:r>
-            <a:endParaRPr lang="es-AR" dirty="0"/>
+              <a:rPr lang="es-AR" altLang="es-AR" dirty="0" err="1"/>
+              <a:t>Tip</a:t>
+            </a:r>
+            <a:r>
+              <a:rPr lang="es-AR" altLang="es-AR" dirty="0"/>
+              <a:t> 2: Inyección de dependencias por constructor</a:t>
+            </a:r>
           </a:p>
           <a:p>
             <a:pPr lvl="1"/>
             <a:r>
-              <a:rPr lang="en-US" dirty="0"/>
-              <a:t>Tip 3: </a:t>
-            </a:r>
-            <a:r>
-              <a:rPr lang="en-US" dirty="0" err="1"/>
-              <a:t>Favorecer</a:t>
-            </a:r>
-            <a:r>
-              <a:rPr lang="en-US" dirty="0"/>
-              <a:t> la </a:t>
-            </a:r>
-            <a:r>
-              <a:rPr lang="en-US" dirty="0" err="1"/>
-              <a:t>composición</a:t>
-            </a:r>
-            <a:r>
-              <a:rPr lang="en-US" dirty="0"/>
-              <a:t> </a:t>
-            </a:r>
-            <a:r>
-              <a:rPr lang="en-US" dirty="0" err="1"/>
-              <a:t>por</a:t>
-            </a:r>
-            <a:r>
-              <a:rPr lang="en-US" dirty="0"/>
-              <a:t> </a:t>
-            </a:r>
-            <a:r>
-              <a:rPr lang="en-US" dirty="0" err="1"/>
-              <a:t>sobre</a:t>
-            </a:r>
-            <a:r>
-              <a:rPr lang="en-US" dirty="0"/>
-              <a:t> la </a:t>
-            </a:r>
-            <a:r>
-              <a:rPr lang="en-US" dirty="0" err="1"/>
-              <a:t>herencia</a:t>
-            </a:r>
-            <a:endParaRPr lang="en-US" dirty="0"/>
+              <a:rPr lang="es-AR" altLang="es-AR" dirty="0"/>
+              <a:t>Permite usar </a:t>
+            </a:r>
+            <a:r>
+              <a:rPr lang="es-AR" altLang="es-AR" dirty="0" err="1"/>
+              <a:t>mocks</a:t>
+            </a:r>
+            <a:r>
+              <a:rPr lang="es-AR" altLang="es-AR" dirty="0"/>
+              <a:t> de dependencias para </a:t>
+            </a:r>
+            <a:r>
+              <a:rPr lang="es-AR" altLang="es-AR" dirty="0" err="1"/>
+              <a:t>tests</a:t>
+            </a:r>
+            <a:r>
+              <a:rPr lang="es-AR" altLang="es-AR" dirty="0"/>
+              <a:t> unitarios</a:t>
+            </a:r>
+          </a:p>
+          <a:p>
+            <a:r>
+              <a:rPr lang="es-AR" altLang="es-AR" dirty="0"/>
+              <a:t>Cuidado con dependencias ocultas</a:t>
+            </a:r>
           </a:p>
           <a:p>
             <a:pPr lvl="1"/>
             <a:r>
-              <a:rPr lang="en-US" dirty="0"/>
-              <a:t>Tip 6: </a:t>
-            </a:r>
-            <a:r>
-              <a:rPr lang="en-US" dirty="0" err="1"/>
-              <a:t>Escribiendo</a:t>
-            </a:r>
-            <a:r>
-              <a:rPr lang="en-US" dirty="0"/>
-              <a:t> </a:t>
-            </a:r>
-            <a:r>
-              <a:rPr lang="en-US" dirty="0" err="1"/>
-              <a:t>código</a:t>
-            </a:r>
-            <a:r>
-              <a:rPr lang="en-US" dirty="0"/>
-              <a:t> </a:t>
-            </a:r>
-            <a:r>
-              <a:rPr lang="en-US" dirty="0" err="1"/>
-              <a:t>testeable</a:t>
-            </a:r>
+              <a:rPr lang="es-AR" altLang="es-AR" dirty="0"/>
+              <a:t>Ej. El constructor crea una instancia de otra clase</a:t>
+            </a:r>
+          </a:p>
+          <a:p>
+            <a:r>
+              <a:rPr lang="es-AR" altLang="es-AR" dirty="0"/>
+              <a:t>Cuando se agregan constructores para inyección de dependencias, mantener un constructor sin parámetros para evitar modificar el código existente</a:t>
+            </a:r>
+          </a:p>
+          <a:p>
+            <a:pPr lvl="1"/>
             <a:endParaRPr lang="es-AR" dirty="0"/>
           </a:p>
         </p:txBody>
@@ -8652,7 +8643,7 @@
     </p:spTree>
     <p:extLst>
       <p:ext uri="{BB962C8B-B14F-4D97-AF65-F5344CB8AC3E}">
-        <p14:creationId xmlns:p14="http://schemas.microsoft.com/office/powerpoint/2010/main" val="2273241619"/>
+        <p14:creationId xmlns:p14="http://schemas.microsoft.com/office/powerpoint/2010/main" val="3742598420"/>
       </p:ext>
     </p:extLst>
   </p:cSld>
@@ -8703,15 +8694,23 @@
           <a:p>
             <a:r>
               <a:rPr lang="en-US" dirty="0"/>
-              <a:t>Tip 2: </a:t>
-            </a:r>
-            <a:r>
-              <a:rPr lang="en-US" dirty="0" err="1"/>
-              <a:t>Testear</a:t>
-            </a:r>
-            <a:r>
-              <a:rPr lang="en-US" dirty="0"/>
-              <a:t> el </a:t>
+              <a:t>Tip 1: </a:t>
+            </a:r>
+            <a:r>
+              <a:rPr lang="en-US" dirty="0" err="1"/>
+              <a:t>Desacoplar</a:t>
+            </a:r>
+            <a:r>
+              <a:rPr lang="en-US" dirty="0"/>
+              <a:t> </a:t>
+            </a:r>
+            <a:r>
+              <a:rPr lang="en-US" dirty="0" err="1"/>
+              <a:t>dependencias</a:t>
+            </a:r>
+            <a:r>
+              <a:rPr lang="en-US" dirty="0"/>
+              <a:t> del </a:t>
             </a:r>
             <a:r>
               <a:rPr lang="en-US" dirty="0" err="1" smtClean="0"/>
@@ -8739,115 +8738,127 @@
           <a:lstStyle/>
           <a:p>
             <a:r>
-              <a:rPr lang="es-AR" altLang="es-AR" dirty="0" smtClean="0"/>
-              <a:t>Desacoplar </a:t>
-            </a:r>
-            <a:r>
               <a:rPr lang="es-AR" altLang="es-AR" dirty="0"/>
-              <a:t>hizo la aplicación </a:t>
+              <a:t>Utilizar </a:t>
             </a:r>
             <a:r>
               <a:rPr lang="es-AR" altLang="es-AR" dirty="0" err="1"/>
+              <a:t>wrappers</a:t>
+            </a:r>
+            <a:r>
+              <a:rPr lang="es-AR" altLang="es-AR" dirty="0"/>
+              <a:t> para desacoplar el código de librerías de terceros que no podemos instanciar</a:t>
+            </a:r>
+          </a:p>
+          <a:p>
+            <a:pPr lvl="1"/>
+            <a:r>
+              <a:rPr lang="en-US" dirty="0"/>
+              <a:t>Tip 7: Wrappers para </a:t>
+            </a:r>
+            <a:r>
+              <a:rPr lang="en-US" dirty="0" err="1"/>
+              <a:t>encapsular</a:t>
+            </a:r>
+            <a:r>
+              <a:rPr lang="en-US" dirty="0"/>
+              <a:t> </a:t>
+            </a:r>
+            <a:r>
+              <a:rPr lang="en-US" dirty="0" err="1"/>
+              <a:t>dependencias</a:t>
+            </a:r>
+            <a:r>
+              <a:rPr lang="en-US" dirty="0"/>
+              <a:t> </a:t>
+            </a:r>
+            <a:r>
+              <a:rPr lang="en-US" dirty="0" err="1"/>
+              <a:t>estáticas</a:t>
+            </a:r>
+            <a:endParaRPr lang="en-US" dirty="0"/>
+          </a:p>
+          <a:p>
+            <a:r>
+              <a:rPr lang="es-AR" dirty="0"/>
+              <a:t>Tener en mente las buenas prácticas para escribir código </a:t>
+            </a:r>
+            <a:r>
+              <a:rPr lang="es-AR" dirty="0" err="1"/>
               <a:t>testeable</a:t>
             </a:r>
-            <a:r>
-              <a:rPr lang="es-AR" altLang="es-AR" dirty="0"/>
-              <a:t>, </a:t>
-            </a:r>
-            <a:r>
-              <a:rPr lang="es-AR" altLang="es-AR" dirty="0" smtClean="0"/>
-              <a:t>¡ahora vamos </a:t>
-            </a:r>
-            <a:r>
-              <a:rPr lang="es-AR" altLang="es-AR" dirty="0"/>
-              <a:t>a testearla!</a:t>
-            </a:r>
+            <a:endParaRPr lang="es-AR" dirty="0"/>
           </a:p>
           <a:p>
             <a:pPr lvl="1"/>
             <a:r>
               <a:rPr lang="en-US" dirty="0"/>
-              <a:t>Tip 4: </a:t>
-            </a:r>
-            <a:r>
-              <a:rPr lang="en-US" dirty="0" err="1"/>
-              <a:t>Generar</a:t>
-            </a:r>
-            <a:r>
-              <a:rPr lang="en-US" dirty="0"/>
-              <a:t> </a:t>
-            </a:r>
-            <a:r>
-              <a:rPr lang="en-US" dirty="0" smtClean="0"/>
-              <a:t>tests </a:t>
-            </a:r>
-            <a:r>
-              <a:rPr lang="en-US" dirty="0" err="1" smtClean="0"/>
-              <a:t>unitarios</a:t>
-            </a:r>
-            <a:endParaRPr lang="es-AR" dirty="0"/>
+              <a:t>Tip 3: </a:t>
+            </a:r>
+            <a:r>
+              <a:rPr lang="en-US" dirty="0" err="1"/>
+              <a:t>Favorecer</a:t>
+            </a:r>
+            <a:r>
+              <a:rPr lang="en-US" dirty="0"/>
+              <a:t> la </a:t>
+            </a:r>
+            <a:r>
+              <a:rPr lang="en-US" dirty="0" err="1"/>
+              <a:t>composición</a:t>
+            </a:r>
+            <a:r>
+              <a:rPr lang="en-US" dirty="0"/>
+              <a:t> </a:t>
+            </a:r>
+            <a:r>
+              <a:rPr lang="en-US" dirty="0" err="1"/>
+              <a:t>por</a:t>
+            </a:r>
+            <a:r>
+              <a:rPr lang="en-US" dirty="0"/>
+              <a:t> </a:t>
+            </a:r>
+            <a:r>
+              <a:rPr lang="en-US" dirty="0" err="1"/>
+              <a:t>sobre</a:t>
+            </a:r>
+            <a:r>
+              <a:rPr lang="en-US" dirty="0"/>
+              <a:t> la </a:t>
+            </a:r>
+            <a:r>
+              <a:rPr lang="en-US" dirty="0" err="1"/>
+              <a:t>herencia</a:t>
+            </a:r>
+            <a:endParaRPr lang="en-US" dirty="0"/>
           </a:p>
           <a:p>
             <a:pPr lvl="1"/>
             <a:r>
               <a:rPr lang="en-US" dirty="0"/>
-              <a:t>Tip 5: Mocking de </a:t>
-            </a:r>
-            <a:r>
-              <a:rPr lang="en-US" dirty="0" err="1"/>
-              <a:t>dependencias</a:t>
-            </a:r>
-            <a:endParaRPr lang="en-US" dirty="0"/>
-          </a:p>
-          <a:p>
-            <a:r>
-              <a:rPr lang="en-US" dirty="0" err="1"/>
-              <a:t>Verificar</a:t>
-            </a:r>
-            <a:r>
-              <a:rPr lang="en-US" dirty="0"/>
-              <a:t> que </a:t>
-            </a:r>
-            <a:r>
-              <a:rPr lang="en-US" dirty="0" err="1"/>
-              <a:t>los</a:t>
-            </a:r>
-            <a:r>
-              <a:rPr lang="en-US" dirty="0"/>
-              <a:t> tests </a:t>
-            </a:r>
-            <a:r>
-              <a:rPr lang="en-US" dirty="0" err="1"/>
-              <a:t>prueben</a:t>
-            </a:r>
-            <a:r>
-              <a:rPr lang="en-US" dirty="0"/>
-              <a:t> </a:t>
-            </a:r>
-            <a:r>
-              <a:rPr lang="en-US" dirty="0" err="1"/>
-              <a:t>correctamente</a:t>
-            </a:r>
-            <a:r>
-              <a:rPr lang="en-US" dirty="0"/>
-              <a:t> el </a:t>
-            </a:r>
-            <a:r>
-              <a:rPr lang="en-US" dirty="0" err="1"/>
-              <a:t>comportamiento</a:t>
-            </a:r>
-            <a:r>
-              <a:rPr lang="en-US" dirty="0"/>
-              <a:t> de la </a:t>
-            </a:r>
-            <a:r>
-              <a:rPr lang="en-US" dirty="0" err="1"/>
-              <a:t>aplicación</a:t>
-            </a:r>
-            <a:endParaRPr lang="es-AR" dirty="0"/>
-          </a:p>
-          <a:p>
-            <a:pPr lvl="1"/>
+              <a:t>Tip 6: </a:t>
+            </a:r>
+            <a:r>
+              <a:rPr lang="en-US" dirty="0" err="1"/>
+              <a:t>Escribiendo</a:t>
+            </a:r>
+            <a:r>
+              <a:rPr lang="en-US" dirty="0"/>
+              <a:t> </a:t>
+            </a:r>
+            <a:r>
+              <a:rPr lang="en-US" dirty="0" err="1"/>
+              <a:t>código</a:t>
+            </a:r>
+            <a:r>
+              <a:rPr lang="en-US" dirty="0"/>
+              <a:t> </a:t>
+            </a:r>
+            <a:r>
+              <a:rPr lang="en-US" dirty="0" err="1"/>
+              <a:t>testeable</a:t>
+            </a:r>
             <a:endParaRPr lang="es-AR" dirty="0"/>
           </a:p>
         </p:txBody>
@@ -8855,7 +8866,7 @@
     </p:spTree>
     <p:extLst>
       <p:ext uri="{BB962C8B-B14F-4D97-AF65-F5344CB8AC3E}">
-        <p14:creationId xmlns:p14="http://schemas.microsoft.com/office/powerpoint/2010/main" val="3638116455"/>
+        <p14:creationId xmlns:p14="http://schemas.microsoft.com/office/powerpoint/2010/main" val="2273241619"/>
       </p:ext>
     </p:extLst>
   </p:cSld>
@@ -8906,6 +8917,209 @@
           <a:p>
             <a:r>
               <a:rPr lang="en-US" dirty="0"/>
+              <a:t>Tip 2: </a:t>
+            </a:r>
+            <a:r>
+              <a:rPr lang="en-US" dirty="0" err="1"/>
+              <a:t>Testear</a:t>
+            </a:r>
+            <a:r>
+              <a:rPr lang="en-US" dirty="0"/>
+              <a:t> el </a:t>
+            </a:r>
+            <a:r>
+              <a:rPr lang="en-US" dirty="0" err="1" smtClean="0"/>
+              <a:t>método</a:t>
+            </a:r>
+            <a:endParaRPr lang="en-US" dirty="0"/>
+          </a:p>
+        </p:txBody>
+      </p:sp>
+      <p:sp>
+        <p:nvSpPr>
+          <p:cNvPr id="3" name="Content Placeholder 2"/>
+          <p:cNvSpPr>
+            <a:spLocks noGrp="1"/>
+          </p:cNvSpPr>
+          <p:nvPr>
+            <p:ph idx="1"/>
+          </p:nvPr>
+        </p:nvSpPr>
+        <p:spPr/>
+        <p:txBody>
+          <a:bodyPr vert="horz" lIns="91440" tIns="45720" rIns="91440" bIns="45720" rtlCol="0">
+            <a:normAutofit/>
+          </a:bodyPr>
+          <a:lstStyle/>
+          <a:p>
+            <a:r>
+              <a:rPr lang="es-AR" altLang="es-AR" dirty="0" smtClean="0"/>
+              <a:t>Desacoplar </a:t>
+            </a:r>
+            <a:r>
+              <a:rPr lang="es-AR" altLang="es-AR" dirty="0"/>
+              <a:t>hizo la aplicación </a:t>
+            </a:r>
+            <a:r>
+              <a:rPr lang="es-AR" altLang="es-AR" dirty="0" err="1"/>
+              <a:t>testeable</a:t>
+            </a:r>
+            <a:r>
+              <a:rPr lang="es-AR" altLang="es-AR" dirty="0"/>
+              <a:t>, </a:t>
+            </a:r>
+            <a:r>
+              <a:rPr lang="es-AR" altLang="es-AR" dirty="0" smtClean="0"/>
+              <a:t>¡ahora vamos </a:t>
+            </a:r>
+            <a:r>
+              <a:rPr lang="es-AR" altLang="es-AR" dirty="0"/>
+              <a:t>a testearla!</a:t>
+            </a:r>
+          </a:p>
+          <a:p>
+            <a:pPr lvl="1"/>
+            <a:r>
+              <a:rPr lang="en-US" dirty="0"/>
+              <a:t>Tip 4: </a:t>
+            </a:r>
+            <a:r>
+              <a:rPr lang="en-US" dirty="0" err="1"/>
+              <a:t>Generar</a:t>
+            </a:r>
+            <a:r>
+              <a:rPr lang="en-US" dirty="0"/>
+              <a:t> </a:t>
+            </a:r>
+            <a:r>
+              <a:rPr lang="en-US" dirty="0" smtClean="0"/>
+              <a:t>tests </a:t>
+            </a:r>
+            <a:r>
+              <a:rPr lang="en-US" dirty="0" err="1" smtClean="0"/>
+              <a:t>unitarios</a:t>
+            </a:r>
+            <a:endParaRPr lang="es-AR" dirty="0"/>
+          </a:p>
+          <a:p>
+            <a:pPr lvl="1"/>
+            <a:r>
+              <a:rPr lang="en-US" dirty="0"/>
+              <a:t>Tip 5: Mocking de </a:t>
+            </a:r>
+            <a:r>
+              <a:rPr lang="en-US" dirty="0" err="1"/>
+              <a:t>dependencias</a:t>
+            </a:r>
+            <a:endParaRPr lang="en-US" dirty="0"/>
+          </a:p>
+          <a:p>
+            <a:r>
+              <a:rPr lang="en-US" dirty="0" err="1"/>
+              <a:t>Verificar</a:t>
+            </a:r>
+            <a:r>
+              <a:rPr lang="en-US" dirty="0"/>
+              <a:t> que </a:t>
+            </a:r>
+            <a:r>
+              <a:rPr lang="en-US" dirty="0" err="1"/>
+              <a:t>los</a:t>
+            </a:r>
+            <a:r>
+              <a:rPr lang="en-US" dirty="0"/>
+              <a:t> tests </a:t>
+            </a:r>
+            <a:r>
+              <a:rPr lang="en-US" dirty="0" err="1"/>
+              <a:t>prueben</a:t>
+            </a:r>
+            <a:r>
+              <a:rPr lang="en-US" dirty="0"/>
+              <a:t> </a:t>
+            </a:r>
+            <a:r>
+              <a:rPr lang="en-US" dirty="0" err="1"/>
+              <a:t>correctamente</a:t>
+            </a:r>
+            <a:r>
+              <a:rPr lang="en-US" dirty="0"/>
+              <a:t> el </a:t>
+            </a:r>
+            <a:r>
+              <a:rPr lang="en-US" dirty="0" err="1"/>
+              <a:t>comportamiento</a:t>
+            </a:r>
+            <a:r>
+              <a:rPr lang="en-US" dirty="0"/>
+              <a:t> de la </a:t>
+            </a:r>
+            <a:r>
+              <a:rPr lang="en-US" dirty="0" err="1"/>
+              <a:t>aplicación</a:t>
+            </a:r>
+            <a:endParaRPr lang="es-AR" dirty="0"/>
+          </a:p>
+          <a:p>
+            <a:pPr lvl="1"/>
+            <a:endParaRPr lang="es-AR" dirty="0"/>
+          </a:p>
+        </p:txBody>
+      </p:sp>
+    </p:spTree>
+    <p:extLst>
+      <p:ext uri="{BB962C8B-B14F-4D97-AF65-F5344CB8AC3E}">
+        <p14:creationId xmlns:p14="http://schemas.microsoft.com/office/powerpoint/2010/main" val="3638116455"/>
+      </p:ext>
+    </p:extLst>
+  </p:cSld>
+  <p:clrMapOvr>
+    <a:masterClrMapping/>
+  </p:clrMapOvr>
+  <p:timing>
+    <p:tnLst>
+      <p:par>
+        <p:cTn id="1" dur="indefinite" restart="never" nodeType="tmRoot"/>
+      </p:par>
+    </p:tnLst>
+  </p:timing>
+</p:sld>
+</file>
+
+<file path=ppt/slides/slide27.xml><?xml version="1.0" encoding="utf-8"?>
+<p:sld xmlns:a="http://schemas.openxmlformats.org/drawingml/2006/main" xmlns:r="http://schemas.openxmlformats.org/officeDocument/2006/relationships" xmlns:p="http://schemas.openxmlformats.org/presentationml/2006/main">
+  <p:cSld>
+    <p:spTree>
+      <p:nvGrpSpPr>
+        <p:cNvPr id="1" name=""/>
+        <p:cNvGrpSpPr/>
+        <p:nvPr/>
+      </p:nvGrpSpPr>
+      <p:grpSpPr>
+        <a:xfrm>
+          <a:off x="0" y="0"/>
+          <a:ext cx="0" cy="0"/>
+          <a:chOff x="0" y="0"/>
+          <a:chExt cx="0" cy="0"/>
+        </a:xfrm>
+      </p:grpSpPr>
+      <p:sp>
+        <p:nvSpPr>
+          <p:cNvPr id="2" name="Title 1"/>
+          <p:cNvSpPr>
+            <a:spLocks noGrp="1"/>
+          </p:cNvSpPr>
+          <p:nvPr>
+            <p:ph type="title"/>
+          </p:nvPr>
+        </p:nvSpPr>
+        <p:spPr/>
+        <p:txBody>
+          <a:bodyPr/>
+          <a:lstStyle/>
+          <a:p>
+            <a:r>
+              <a:rPr lang="en-US" dirty="0"/>
               <a:t>Tip 3: </a:t>
             </a:r>
             <a:r>
@@ -9060,7 +9274,7 @@
 </p:sld>
 </file>
 
-<file path=ppt/slides/slide27.xml><?xml version="1.0" encoding="utf-8"?>
+<file path=ppt/slides/slide28.xml><?xml version="1.0" encoding="utf-8"?>
 <p:sld xmlns:a="http://schemas.openxmlformats.org/drawingml/2006/main" xmlns:r="http://schemas.openxmlformats.org/officeDocument/2006/relationships" xmlns:p="http://schemas.openxmlformats.org/presentationml/2006/main">
   <p:cSld>
     <p:spTree>
@@ -9212,7 +9426,7 @@
 </p:sld>
 </file>
 
-<file path=ppt/slides/slide28.xml><?xml version="1.0" encoding="utf-8"?>
+<file path=ppt/slides/slide29.xml><?xml version="1.0" encoding="utf-8"?>
 <p:sld xmlns:a="http://schemas.openxmlformats.org/drawingml/2006/main" xmlns:r="http://schemas.openxmlformats.org/officeDocument/2006/relationships" xmlns:p="http://schemas.openxmlformats.org/presentationml/2006/main">
   <p:cSld>
     <p:spTree>
@@ -9464,93 +9678,6 @@
 </p:sld>
 </file>
 
-<file path=ppt/slides/slide29.xml><?xml version="1.0" encoding="utf-8"?>
-<p:sld xmlns:a="http://schemas.openxmlformats.org/drawingml/2006/main" xmlns:r="http://schemas.openxmlformats.org/officeDocument/2006/relationships" xmlns:p="http://schemas.openxmlformats.org/presentationml/2006/main">
-  <p:cSld>
-    <p:spTree>
-      <p:nvGrpSpPr>
-        <p:cNvPr id="1" name=""/>
-        <p:cNvGrpSpPr/>
-        <p:nvPr/>
-      </p:nvGrpSpPr>
-      <p:grpSpPr>
-        <a:xfrm>
-          <a:off x="0" y="0"/>
-          <a:ext cx="0" cy="0"/>
-          <a:chOff x="0" y="0"/>
-          <a:chExt cx="0" cy="0"/>
-        </a:xfrm>
-      </p:grpSpPr>
-      <p:sp>
-        <p:nvSpPr>
-          <p:cNvPr id="4" name="Title 3"/>
-          <p:cNvSpPr>
-            <a:spLocks noGrp="1"/>
-          </p:cNvSpPr>
-          <p:nvPr>
-            <p:ph type="title"/>
-          </p:nvPr>
-        </p:nvSpPr>
-        <p:spPr/>
-        <p:txBody>
-          <a:bodyPr/>
-          <a:lstStyle/>
-          <a:p>
-            <a:r>
-              <a:rPr lang="es-AR" dirty="0" err="1" smtClean="0"/>
-              <a:t>Coding</a:t>
-            </a:r>
-            <a:r>
-              <a:rPr lang="es-AR" dirty="0" smtClean="0"/>
-              <a:t> time!</a:t>
-            </a:r>
-            <a:endParaRPr lang="es-AR" dirty="0"/>
-          </a:p>
-        </p:txBody>
-      </p:sp>
-      <p:sp>
-        <p:nvSpPr>
-          <p:cNvPr id="5" name="Text Placeholder 4"/>
-          <p:cNvSpPr>
-            <a:spLocks noGrp="1"/>
-          </p:cNvSpPr>
-          <p:nvPr>
-            <p:ph type="body" idx="1"/>
-          </p:nvPr>
-        </p:nvSpPr>
-        <p:spPr/>
-        <p:txBody>
-          <a:bodyPr/>
-          <a:lstStyle/>
-          <a:p>
-            <a:r>
-              <a:rPr lang="es-AR" dirty="0" smtClean="0"/>
-              <a:t>¡A ensuciarse las manos!</a:t>
-            </a:r>
-            <a:endParaRPr lang="es-AR" dirty="0"/>
-          </a:p>
-        </p:txBody>
-      </p:sp>
-    </p:spTree>
-    <p:extLst>
-      <p:ext uri="{BB962C8B-B14F-4D97-AF65-F5344CB8AC3E}">
-        <p14:creationId xmlns:p14="http://schemas.microsoft.com/office/powerpoint/2010/main" val="2169017838"/>
-      </p:ext>
-    </p:extLst>
-  </p:cSld>
-  <p:clrMapOvr>
-    <a:masterClrMapping/>
-  </p:clrMapOvr>
-  <p:timing>
-    <p:tnLst>
-      <p:par>
-        <p:cTn id="1" dur="indefinite" restart="never" nodeType="tmRoot"/>
-      </p:par>
-    </p:tnLst>
-  </p:timing>
-</p:sld>
-</file>
-
 <file path=ppt/slides/slide3.xml><?xml version="1.0" encoding="utf-8"?>
 <p:sld xmlns:a="http://schemas.openxmlformats.org/drawingml/2006/main" xmlns:r="http://schemas.openxmlformats.org/officeDocument/2006/relationships" xmlns:p="http://schemas.openxmlformats.org/presentationml/2006/main">
   <p:cSld>
@@ -9570,7 +9697,7 @@
       </p:grpSpPr>
       <p:sp>
         <p:nvSpPr>
-          <p:cNvPr id="4" name="Title 3"/>
+          <p:cNvPr id="2" name="Title 1"/>
           <p:cNvSpPr>
             <a:spLocks noGrp="1"/>
           </p:cNvSpPr>
@@ -9584,40 +9711,111 @@
           <a:lstStyle/>
           <a:p>
             <a:r>
-              <a:rPr lang="es-AR" dirty="0" smtClean="0"/>
-              <a:t>Objetivos</a:t>
-            </a:r>
-            <a:endParaRPr lang="es-AR" dirty="0"/>
+              <a:rPr lang="en-US" dirty="0" smtClean="0"/>
+              <a:t>GitHub</a:t>
+            </a:r>
+            <a:endParaRPr lang="en-US" dirty="0"/>
           </a:p>
         </p:txBody>
       </p:sp>
       <p:sp>
         <p:nvSpPr>
-          <p:cNvPr id="5" name="Text Placeholder 4"/>
+          <p:cNvPr id="3" name="Content Placeholder 2"/>
           <p:cNvSpPr>
             <a:spLocks noGrp="1"/>
           </p:cNvSpPr>
           <p:nvPr>
-            <p:ph type="body" idx="1"/>
+            <p:ph idx="1"/>
           </p:nvPr>
         </p:nvSpPr>
         <p:spPr/>
         <p:txBody>
-          <a:bodyPr/>
+          <a:bodyPr>
+            <a:normAutofit/>
+          </a:bodyPr>
           <a:lstStyle/>
           <a:p>
             <a:r>
               <a:rPr lang="es-AR" dirty="0" smtClean="0"/>
-              <a:t>¿Qué queremos transmitir?</a:t>
-            </a:r>
+              <a:t>URL: </a:t>
+            </a:r>
+            <a:r>
+              <a:rPr lang="es-AR" dirty="0" smtClean="0">
+                <a:hlinkClick r:id="rId2"/>
+              </a:rPr>
+              <a:t>https</a:t>
+            </a:r>
+            <a:r>
+              <a:rPr lang="es-AR" dirty="0">
+                <a:hlinkClick r:id="rId2"/>
+              </a:rPr>
+              <a:t>://github.com/baufest-ms</a:t>
+            </a:r>
+            <a:r>
+              <a:rPr lang="es-AR" dirty="0" smtClean="0">
+                <a:hlinkClick r:id="rId2"/>
+              </a:rPr>
+              <a:t>/</a:t>
+            </a:r>
+            <a:endParaRPr lang="es-AR" dirty="0" smtClean="0"/>
+          </a:p>
+          <a:p>
+            <a:r>
+              <a:rPr lang="es-AR" dirty="0"/>
+              <a:t>Repositorio: DesigningTestableApplications-.NETConfARv2018</a:t>
+            </a:r>
+            <a:endParaRPr lang="es-AR" dirty="0" smtClean="0"/>
+          </a:p>
+          <a:p>
             <a:endParaRPr lang="es-AR" dirty="0"/>
           </a:p>
         </p:txBody>
       </p:sp>
+      <p:pic>
+        <p:nvPicPr>
+          <p:cNvPr id="1028" name="Picture 4" descr="Resultado de imagen para github"/>
+          <p:cNvPicPr>
+            <a:picLocks noChangeAspect="1" noChangeArrowheads="1"/>
+          </p:cNvPicPr>
+          <p:nvPr/>
+        </p:nvPicPr>
+        <p:blipFill>
+          <a:blip r:embed="rId3">
+            <a:extLst>
+              <a:ext uri="{28A0092B-C50C-407E-A947-70E740481C1C}">
+                <a14:useLocalDpi xmlns:a14="http://schemas.microsoft.com/office/drawing/2010/main" val="0"/>
+              </a:ext>
+            </a:extLst>
+          </a:blip>
+          <a:srcRect/>
+          <a:stretch>
+            <a:fillRect/>
+          </a:stretch>
+        </p:blipFill>
+        <p:spPr bwMode="auto">
+          <a:xfrm>
+            <a:off x="3673042" y="3121025"/>
+            <a:ext cx="4845916" cy="2544106"/>
+          </a:xfrm>
+          <a:prstGeom prst="rect">
+            <a:avLst/>
+          </a:prstGeom>
+          <a:noFill/>
+          <a:extLst>
+            <a:ext uri="{909E8E84-426E-40DD-AFC4-6F175D3DCCD1}">
+              <a14:hiddenFill xmlns:a14="http://schemas.microsoft.com/office/drawing/2010/main">
+                <a:solidFill>
+                  <a:srgbClr val="FFFFFF"/>
+                </a:solidFill>
+              </a14:hiddenFill>
+            </a:ext>
+          </a:extLst>
+        </p:spPr>
+      </p:pic>
     </p:spTree>
     <p:extLst>
       <p:ext uri="{BB962C8B-B14F-4D97-AF65-F5344CB8AC3E}">
-        <p14:creationId xmlns:p14="http://schemas.microsoft.com/office/powerpoint/2010/main" val="82463951"/>
+        <p14:creationId xmlns:p14="http://schemas.microsoft.com/office/powerpoint/2010/main" val="2574229891"/>
       </p:ext>
     </p:extLst>
   </p:cSld>
@@ -9653,7 +9851,7 @@
       </p:grpSpPr>
       <p:sp>
         <p:nvSpPr>
-          <p:cNvPr id="2" name="Title 1"/>
+          <p:cNvPr id="4" name="Title 3"/>
           <p:cNvSpPr>
             <a:spLocks noGrp="1"/>
           </p:cNvSpPr>
@@ -9667,186 +9865,35 @@
           <a:lstStyle/>
           <a:p>
             <a:r>
-              <a:rPr lang="en-US" dirty="0" smtClean="0"/>
-              <a:t>Coding time!</a:t>
-            </a:r>
-            <a:endParaRPr lang="en-US" dirty="0"/>
+              <a:rPr lang="es-AR" dirty="0" err="1" smtClean="0"/>
+              <a:t>Coding</a:t>
+            </a:r>
+            <a:r>
+              <a:rPr lang="es-AR" dirty="0" smtClean="0"/>
+              <a:t> time!</a:t>
+            </a:r>
+            <a:endParaRPr lang="es-AR" dirty="0"/>
           </a:p>
         </p:txBody>
       </p:sp>
       <p:sp>
         <p:nvSpPr>
-          <p:cNvPr id="3" name="Content Placeholder 2"/>
+          <p:cNvPr id="5" name="Text Placeholder 4"/>
           <p:cNvSpPr>
             <a:spLocks noGrp="1"/>
           </p:cNvSpPr>
           <p:nvPr>
-            <p:ph idx="1"/>
+            <p:ph type="body" idx="1"/>
           </p:nvPr>
         </p:nvSpPr>
-        <p:spPr>
-          <a:xfrm>
-            <a:off x="838200" y="1509950"/>
-            <a:ext cx="10515600" cy="4528467"/>
-          </a:xfrm>
-        </p:spPr>
+        <p:spPr/>
         <p:txBody>
-          <a:bodyPr vert="horz" lIns="91440" tIns="45720" rIns="91440" bIns="45720" rtlCol="0">
-            <a:noAutofit/>
-          </a:bodyPr>
+          <a:bodyPr/>
           <a:lstStyle/>
           <a:p>
-            <a:pPr lvl="1"/>
             <a:r>
               <a:rPr lang="es-AR" dirty="0" smtClean="0"/>
-              <a:t>Como </a:t>
-            </a:r>
-            <a:r>
-              <a:rPr lang="es-AR" dirty="0"/>
-              <a:t>la empresa </a:t>
-            </a:r>
-            <a:r>
-              <a:rPr lang="es-AR" dirty="0" smtClean="0"/>
-              <a:t>de venta de productos tecnológicos está </a:t>
-            </a:r>
-            <a:r>
-              <a:rPr lang="es-AR" dirty="0"/>
-              <a:t>festejando su 27° aniversario, los directivos decidieron ofrecer </a:t>
-            </a:r>
-            <a:r>
-              <a:rPr lang="es-AR" dirty="0" smtClean="0"/>
-              <a:t>un incentivo especial a sus clientes: quienes realicen compras superiores a $20.000, recibirán un “</a:t>
-            </a:r>
-            <a:r>
-              <a:rPr lang="es-AR" i="1" dirty="0" smtClean="0"/>
-              <a:t>Pen Drive</a:t>
-            </a:r>
-            <a:r>
-              <a:rPr lang="es-AR" dirty="0" smtClean="0"/>
-              <a:t>” de regalo</a:t>
-            </a:r>
-            <a:endParaRPr lang="es-AR" dirty="0"/>
-          </a:p>
-          <a:p>
-            <a:pPr lvl="1"/>
-            <a:r>
-              <a:rPr lang="es-AR" dirty="0" smtClean="0"/>
-              <a:t>Implementar </a:t>
-            </a:r>
-            <a:r>
-              <a:rPr lang="es-AR" dirty="0"/>
-              <a:t>los nuevos requerimientos de </a:t>
-            </a:r>
-            <a:r>
-              <a:rPr lang="es-AR" dirty="0" smtClean="0"/>
-              <a:t>negocio sin que se </a:t>
-            </a:r>
-            <a:r>
-              <a:rPr lang="es-AR" dirty="0"/>
-              <a:t>vea afectada la funcionalidad </a:t>
-            </a:r>
-            <a:r>
-              <a:rPr lang="es-AR" dirty="0" smtClean="0"/>
-              <a:t>actual</a:t>
-            </a:r>
-          </a:p>
-          <a:p>
-            <a:pPr lvl="1"/>
-            <a:r>
-              <a:rPr lang="es-AR" dirty="0" smtClean="0"/>
-              <a:t>Asegurar mediante </a:t>
-            </a:r>
-            <a:r>
-              <a:rPr lang="es-AR" dirty="0" err="1"/>
-              <a:t>tests</a:t>
-            </a:r>
-            <a:r>
-              <a:rPr lang="es-AR" dirty="0"/>
-              <a:t> </a:t>
-            </a:r>
-            <a:r>
-              <a:rPr lang="es-AR" dirty="0" smtClean="0"/>
-              <a:t>unitarios de la clase </a:t>
-            </a:r>
-            <a:r>
-              <a:rPr lang="es-AR" dirty="0" err="1" smtClean="0"/>
-              <a:t>OrdersService</a:t>
-            </a:r>
-            <a:r>
-              <a:rPr lang="es-AR" dirty="0" smtClean="0"/>
-              <a:t> </a:t>
-            </a:r>
-            <a:r>
-              <a:rPr lang="es-AR" dirty="0"/>
-              <a:t>que los </a:t>
-            </a:r>
-            <a:r>
-              <a:rPr lang="es-AR" dirty="0" smtClean="0"/>
-              <a:t>nuevos requerimientos se </a:t>
-            </a:r>
-            <a:r>
-              <a:rPr lang="es-AR" dirty="0"/>
-              <a:t>cumplan </a:t>
-            </a:r>
-            <a:r>
-              <a:rPr lang="es-AR" dirty="0" smtClean="0"/>
-              <a:t>adecuadamente</a:t>
-            </a:r>
-            <a:endParaRPr lang="es-AR" dirty="0"/>
-          </a:p>
-          <a:p>
-            <a:pPr lvl="1"/>
-            <a:r>
-              <a:rPr lang="es-AR" dirty="0" smtClean="0"/>
-              <a:t>Los </a:t>
-            </a:r>
-            <a:r>
-              <a:rPr lang="es-AR" dirty="0" err="1" smtClean="0"/>
-              <a:t>tests</a:t>
-            </a:r>
-            <a:r>
-              <a:rPr lang="es-AR" dirty="0" smtClean="0"/>
-              <a:t> que </a:t>
-            </a:r>
-            <a:r>
-              <a:rPr lang="es-AR" dirty="0"/>
-              <a:t>ya tiene la aplicación </a:t>
-            </a:r>
-            <a:r>
-              <a:rPr lang="es-AR" dirty="0" smtClean="0"/>
-              <a:t>deben </a:t>
-            </a:r>
-            <a:r>
-              <a:rPr lang="es-AR" dirty="0"/>
-              <a:t>seguir ejecutando </a:t>
-            </a:r>
-            <a:r>
-              <a:rPr lang="es-AR" dirty="0" smtClean="0"/>
-              <a:t>exitosamente</a:t>
-            </a:r>
-            <a:endParaRPr lang="es-AR" dirty="0"/>
-          </a:p>
-          <a:p>
-            <a:pPr lvl="1"/>
-            <a:r>
-              <a:rPr lang="es-AR" dirty="0"/>
-              <a:t>Se permite (¡y recomienda!) hacer todos los cambios que sean necesarios para </a:t>
-            </a:r>
-            <a:r>
-              <a:rPr lang="es-AR" dirty="0" smtClean="0"/>
-              <a:t>que la </a:t>
-            </a:r>
-            <a:r>
-              <a:rPr lang="es-AR" dirty="0"/>
-              <a:t>aplicación sea </a:t>
-            </a:r>
-            <a:r>
-              <a:rPr lang="es-AR" dirty="0" err="1" smtClean="0"/>
-              <a:t>testeable</a:t>
-            </a:r>
-            <a:r>
-              <a:rPr lang="es-AR" dirty="0" smtClean="0"/>
-              <a:t> de forma unitaria</a:t>
+              <a:t>¡A ensuciarse las manos!</a:t>
             </a:r>
             <a:endParaRPr lang="es-AR" dirty="0"/>
           </a:p>
@@ -9855,7 +9902,7 @@
     </p:spTree>
     <p:extLst>
       <p:ext uri="{BB962C8B-B14F-4D97-AF65-F5344CB8AC3E}">
-        <p14:creationId xmlns:p14="http://schemas.microsoft.com/office/powerpoint/2010/main" val="4270728186"/>
+        <p14:creationId xmlns:p14="http://schemas.microsoft.com/office/powerpoint/2010/main" val="2169017838"/>
       </p:ext>
     </p:extLst>
   </p:cSld>
@@ -9891,6 +9938,244 @@
       </p:grpSpPr>
       <p:sp>
         <p:nvSpPr>
+          <p:cNvPr id="2" name="Title 1"/>
+          <p:cNvSpPr>
+            <a:spLocks noGrp="1"/>
+          </p:cNvSpPr>
+          <p:nvPr>
+            <p:ph type="title"/>
+          </p:nvPr>
+        </p:nvSpPr>
+        <p:spPr/>
+        <p:txBody>
+          <a:bodyPr/>
+          <a:lstStyle/>
+          <a:p>
+            <a:r>
+              <a:rPr lang="en-US" dirty="0" smtClean="0"/>
+              <a:t>Coding time!</a:t>
+            </a:r>
+            <a:endParaRPr lang="en-US" dirty="0"/>
+          </a:p>
+        </p:txBody>
+      </p:sp>
+      <p:sp>
+        <p:nvSpPr>
+          <p:cNvPr id="3" name="Content Placeholder 2"/>
+          <p:cNvSpPr>
+            <a:spLocks noGrp="1"/>
+          </p:cNvSpPr>
+          <p:nvPr>
+            <p:ph idx="1"/>
+          </p:nvPr>
+        </p:nvSpPr>
+        <p:spPr>
+          <a:xfrm>
+            <a:off x="838200" y="1509950"/>
+            <a:ext cx="10515600" cy="4528467"/>
+          </a:xfrm>
+        </p:spPr>
+        <p:txBody>
+          <a:bodyPr vert="horz" lIns="91440" tIns="45720" rIns="91440" bIns="45720" rtlCol="0">
+            <a:noAutofit/>
+          </a:bodyPr>
+          <a:lstStyle/>
+          <a:p>
+            <a:pPr lvl="1"/>
+            <a:r>
+              <a:rPr lang="es-AR" dirty="0" smtClean="0"/>
+              <a:t>Como </a:t>
+            </a:r>
+            <a:r>
+              <a:rPr lang="es-AR" dirty="0"/>
+              <a:t>la empresa </a:t>
+            </a:r>
+            <a:r>
+              <a:rPr lang="es-AR" dirty="0" smtClean="0"/>
+              <a:t>de venta de productos tecnológicos está </a:t>
+            </a:r>
+            <a:r>
+              <a:rPr lang="es-AR" dirty="0"/>
+              <a:t>festejando su 27° aniversario, los directivos decidieron ofrecer </a:t>
+            </a:r>
+            <a:r>
+              <a:rPr lang="es-AR" dirty="0" smtClean="0"/>
+              <a:t>un incentivo especial a sus clientes: quienes realicen compras superiores a $20.000, recibirán un “</a:t>
+            </a:r>
+            <a:r>
+              <a:rPr lang="es-AR" i="1" dirty="0" smtClean="0"/>
+              <a:t>Pen Drive</a:t>
+            </a:r>
+            <a:r>
+              <a:rPr lang="es-AR" dirty="0" smtClean="0"/>
+              <a:t>” de regalo</a:t>
+            </a:r>
+            <a:endParaRPr lang="es-AR" dirty="0"/>
+          </a:p>
+          <a:p>
+            <a:pPr lvl="1"/>
+            <a:r>
+              <a:rPr lang="es-AR" dirty="0" smtClean="0"/>
+              <a:t>Implementar </a:t>
+            </a:r>
+            <a:r>
+              <a:rPr lang="es-AR" dirty="0"/>
+              <a:t>los nuevos requerimientos de </a:t>
+            </a:r>
+            <a:r>
+              <a:rPr lang="es-AR" dirty="0" smtClean="0"/>
+              <a:t>negocio sin que se </a:t>
+            </a:r>
+            <a:r>
+              <a:rPr lang="es-AR" dirty="0"/>
+              <a:t>vea afectada la funcionalidad </a:t>
+            </a:r>
+            <a:r>
+              <a:rPr lang="es-AR" dirty="0" smtClean="0"/>
+              <a:t>actual</a:t>
+            </a:r>
+          </a:p>
+          <a:p>
+            <a:pPr lvl="1"/>
+            <a:r>
+              <a:rPr lang="es-AR" dirty="0" smtClean="0"/>
+              <a:t>Asegurar mediante </a:t>
+            </a:r>
+            <a:r>
+              <a:rPr lang="es-AR" dirty="0" err="1"/>
+              <a:t>tests</a:t>
+            </a:r>
+            <a:r>
+              <a:rPr lang="es-AR" dirty="0"/>
+              <a:t> </a:t>
+            </a:r>
+            <a:r>
+              <a:rPr lang="es-AR" dirty="0" smtClean="0"/>
+              <a:t>unitarios de la clase </a:t>
+            </a:r>
+            <a:r>
+              <a:rPr lang="es-AR" dirty="0" err="1" smtClean="0"/>
+              <a:t>OrdersService</a:t>
+            </a:r>
+            <a:r>
+              <a:rPr lang="es-AR" dirty="0" smtClean="0"/>
+              <a:t> </a:t>
+            </a:r>
+            <a:r>
+              <a:rPr lang="es-AR" dirty="0"/>
+              <a:t>que los </a:t>
+            </a:r>
+            <a:r>
+              <a:rPr lang="es-AR" dirty="0" smtClean="0"/>
+              <a:t>nuevos requerimientos se </a:t>
+            </a:r>
+            <a:r>
+              <a:rPr lang="es-AR" dirty="0"/>
+              <a:t>cumplan </a:t>
+            </a:r>
+            <a:r>
+              <a:rPr lang="es-AR" dirty="0" smtClean="0"/>
+              <a:t>adecuadamente</a:t>
+            </a:r>
+            <a:endParaRPr lang="es-AR" dirty="0"/>
+          </a:p>
+          <a:p>
+            <a:pPr lvl="1"/>
+            <a:r>
+              <a:rPr lang="es-AR" dirty="0" smtClean="0"/>
+              <a:t>Los </a:t>
+            </a:r>
+            <a:r>
+              <a:rPr lang="es-AR" dirty="0" err="1" smtClean="0"/>
+              <a:t>tests</a:t>
+            </a:r>
+            <a:r>
+              <a:rPr lang="es-AR" dirty="0" smtClean="0"/>
+              <a:t> que </a:t>
+            </a:r>
+            <a:r>
+              <a:rPr lang="es-AR" dirty="0"/>
+              <a:t>ya tiene la aplicación </a:t>
+            </a:r>
+            <a:r>
+              <a:rPr lang="es-AR" dirty="0" smtClean="0"/>
+              <a:t>deben </a:t>
+            </a:r>
+            <a:r>
+              <a:rPr lang="es-AR" dirty="0"/>
+              <a:t>seguir ejecutando </a:t>
+            </a:r>
+            <a:r>
+              <a:rPr lang="es-AR" dirty="0" smtClean="0"/>
+              <a:t>exitosamente</a:t>
+            </a:r>
+            <a:endParaRPr lang="es-AR" dirty="0"/>
+          </a:p>
+          <a:p>
+            <a:pPr lvl="1"/>
+            <a:r>
+              <a:rPr lang="es-AR" dirty="0"/>
+              <a:t>Se permite (¡y recomienda!) hacer todos los cambios que sean necesarios para </a:t>
+            </a:r>
+            <a:r>
+              <a:rPr lang="es-AR" dirty="0" smtClean="0"/>
+              <a:t>que la </a:t>
+            </a:r>
+            <a:r>
+              <a:rPr lang="es-AR" dirty="0"/>
+              <a:t>aplicación sea </a:t>
+            </a:r>
+            <a:r>
+              <a:rPr lang="es-AR" dirty="0" err="1" smtClean="0"/>
+              <a:t>testeable</a:t>
+            </a:r>
+            <a:r>
+              <a:rPr lang="es-AR" dirty="0" smtClean="0"/>
+              <a:t> de forma unitaria</a:t>
+            </a:r>
+            <a:endParaRPr lang="es-AR" dirty="0"/>
+          </a:p>
+        </p:txBody>
+      </p:sp>
+    </p:spTree>
+    <p:extLst>
+      <p:ext uri="{BB962C8B-B14F-4D97-AF65-F5344CB8AC3E}">
+        <p14:creationId xmlns:p14="http://schemas.microsoft.com/office/powerpoint/2010/main" val="4270728186"/>
+      </p:ext>
+    </p:extLst>
+  </p:cSld>
+  <p:clrMapOvr>
+    <a:masterClrMapping/>
+  </p:clrMapOvr>
+  <p:timing>
+    <p:tnLst>
+      <p:par>
+        <p:cTn id="1" dur="indefinite" restart="never" nodeType="tmRoot"/>
+      </p:par>
+    </p:tnLst>
+  </p:timing>
+</p:sld>
+</file>
+
+<file path=ppt/slides/slide32.xml><?xml version="1.0" encoding="utf-8"?>
+<p:sld xmlns:a="http://schemas.openxmlformats.org/drawingml/2006/main" xmlns:r="http://schemas.openxmlformats.org/officeDocument/2006/relationships" xmlns:p="http://schemas.openxmlformats.org/presentationml/2006/main">
+  <p:cSld>
+    <p:spTree>
+      <p:nvGrpSpPr>
+        <p:cNvPr id="1" name=""/>
+        <p:cNvGrpSpPr/>
+        <p:nvPr/>
+      </p:nvGrpSpPr>
+      <p:grpSpPr>
+        <a:xfrm>
+          <a:off x="0" y="0"/>
+          <a:ext cx="0" cy="0"/>
+          <a:chOff x="0" y="0"/>
+          <a:chExt cx="0" cy="0"/>
+        </a:xfrm>
+      </p:grpSpPr>
+      <p:sp>
+        <p:nvSpPr>
           <p:cNvPr id="4" name="Title 3"/>
           <p:cNvSpPr>
             <a:spLocks noGrp="1"/>
@@ -9955,7 +10240,7 @@
 </p:sld>
 </file>
 
-<file path=ppt/slides/slide32.xml><?xml version="1.0" encoding="utf-8"?>
+<file path=ppt/slides/slide33.xml><?xml version="1.0" encoding="utf-8"?>
 <p:sld xmlns:a="http://schemas.openxmlformats.org/drawingml/2006/main" xmlns:r="http://schemas.openxmlformats.org/officeDocument/2006/relationships" xmlns:p="http://schemas.openxmlformats.org/presentationml/2006/main">
   <p:cSld>
     <p:spTree>
@@ -11181,7 +11466,7 @@
       </p:grpSpPr>
       <p:sp>
         <p:nvSpPr>
-          <p:cNvPr id="2" name="Title 1"/>
+          <p:cNvPr id="4" name="Title 3"/>
           <p:cNvSpPr>
             <a:spLocks noGrp="1"/>
           </p:cNvSpPr>
@@ -11195,79 +11480,31 @@
           <a:lstStyle/>
           <a:p>
             <a:r>
-              <a:rPr lang="en-US" dirty="0" err="1" smtClean="0"/>
+              <a:rPr lang="es-AR" dirty="0" smtClean="0"/>
               <a:t>Objetivos</a:t>
             </a:r>
-            <a:endParaRPr lang="en-US" dirty="0"/>
+            <a:endParaRPr lang="es-AR" dirty="0"/>
           </a:p>
         </p:txBody>
       </p:sp>
       <p:sp>
         <p:nvSpPr>
-          <p:cNvPr id="3" name="Content Placeholder 2"/>
+          <p:cNvPr id="5" name="Text Placeholder 4"/>
           <p:cNvSpPr>
             <a:spLocks noGrp="1"/>
           </p:cNvSpPr>
           <p:nvPr>
-            <p:ph idx="1"/>
+            <p:ph type="body" idx="1"/>
           </p:nvPr>
         </p:nvSpPr>
         <p:spPr/>
         <p:txBody>
-          <a:bodyPr vert="horz" lIns="91440" tIns="45720" rIns="91440" bIns="45720" rtlCol="0">
-            <a:normAutofit/>
-          </a:bodyPr>
+          <a:bodyPr/>
           <a:lstStyle/>
           <a:p>
             <a:r>
-              <a:rPr lang="es-AR" dirty="0"/>
-              <a:t>Entender el concepto de aplicaciones </a:t>
-            </a:r>
-            <a:r>
-              <a:rPr lang="es-AR" dirty="0" err="1"/>
-              <a:t>testeables</a:t>
-            </a:r>
-            <a:r>
-              <a:rPr lang="es-AR" dirty="0"/>
-              <a:t> (¿Qué?)</a:t>
-            </a:r>
-          </a:p>
-          <a:p>
-            <a:r>
-              <a:rPr lang="es-AR" dirty="0"/>
-              <a:t>Proveer a los desarrolladores las herramientas necesarias para diseñar y desarrollar aplicaciones </a:t>
-            </a:r>
-            <a:r>
-              <a:rPr lang="es-AR" dirty="0" err="1"/>
-              <a:t>testeables</a:t>
-            </a:r>
-            <a:r>
-              <a:rPr lang="es-AR" dirty="0"/>
-              <a:t> (¿Cómo?)</a:t>
-            </a:r>
-          </a:p>
-          <a:p>
-            <a:r>
-              <a:rPr lang="es-AR" dirty="0"/>
-              <a:t>Visualizar las ventajas de utilizar estas prácticas (¿Por qué?)</a:t>
-            </a:r>
-          </a:p>
-          <a:p>
-            <a:r>
-              <a:rPr lang="es-AR" dirty="0"/>
-              <a:t>Heredé código legacy no </a:t>
-            </a:r>
-            <a:r>
-              <a:rPr lang="es-AR" dirty="0" err="1"/>
-              <a:t>testeable</a:t>
-            </a:r>
-            <a:r>
-              <a:rPr lang="es-AR" dirty="0"/>
-              <a:t>. ¿Por dónde </a:t>
-            </a:r>
-            <a:r>
               <a:rPr lang="es-AR" dirty="0" smtClean="0"/>
-              <a:t>empezamos?</a:t>
+              <a:t>¿Qué queremos transmitir?</a:t>
             </a:r>
             <a:endParaRPr lang="es-AR" dirty="0"/>
           </a:p>
@@ -11276,7 +11513,7 @@
     </p:spTree>
     <p:extLst>
       <p:ext uri="{BB962C8B-B14F-4D97-AF65-F5344CB8AC3E}">
-        <p14:creationId xmlns:p14="http://schemas.microsoft.com/office/powerpoint/2010/main" val="647571016"/>
+        <p14:creationId xmlns:p14="http://schemas.microsoft.com/office/powerpoint/2010/main" val="82463951"/>
       </p:ext>
     </p:extLst>
   </p:cSld>
@@ -11312,6 +11549,137 @@
       </p:grpSpPr>
       <p:sp>
         <p:nvSpPr>
+          <p:cNvPr id="2" name="Title 1"/>
+          <p:cNvSpPr>
+            <a:spLocks noGrp="1"/>
+          </p:cNvSpPr>
+          <p:nvPr>
+            <p:ph type="title"/>
+          </p:nvPr>
+        </p:nvSpPr>
+        <p:spPr/>
+        <p:txBody>
+          <a:bodyPr/>
+          <a:lstStyle/>
+          <a:p>
+            <a:r>
+              <a:rPr lang="en-US" dirty="0" err="1" smtClean="0"/>
+              <a:t>Objetivos</a:t>
+            </a:r>
+            <a:endParaRPr lang="en-US" dirty="0"/>
+          </a:p>
+        </p:txBody>
+      </p:sp>
+      <p:sp>
+        <p:nvSpPr>
+          <p:cNvPr id="3" name="Content Placeholder 2"/>
+          <p:cNvSpPr>
+            <a:spLocks noGrp="1"/>
+          </p:cNvSpPr>
+          <p:nvPr>
+            <p:ph idx="1"/>
+          </p:nvPr>
+        </p:nvSpPr>
+        <p:spPr/>
+        <p:txBody>
+          <a:bodyPr vert="horz" lIns="91440" tIns="45720" rIns="91440" bIns="45720" rtlCol="0">
+            <a:normAutofit/>
+          </a:bodyPr>
+          <a:lstStyle/>
+          <a:p>
+            <a:r>
+              <a:rPr lang="es-AR" dirty="0"/>
+              <a:t>Entender el concepto de aplicaciones </a:t>
+            </a:r>
+            <a:r>
+              <a:rPr lang="es-AR" dirty="0" err="1"/>
+              <a:t>testeables</a:t>
+            </a:r>
+            <a:r>
+              <a:rPr lang="es-AR" dirty="0"/>
+              <a:t> (¿Qué?)</a:t>
+            </a:r>
+          </a:p>
+          <a:p>
+            <a:r>
+              <a:rPr lang="es-AR" dirty="0"/>
+              <a:t>Proveer a los desarrolladores las herramientas necesarias para diseñar y desarrollar aplicaciones </a:t>
+            </a:r>
+            <a:r>
+              <a:rPr lang="es-AR" dirty="0" err="1"/>
+              <a:t>testeables</a:t>
+            </a:r>
+            <a:r>
+              <a:rPr lang="es-AR" dirty="0"/>
+              <a:t> (¿Cómo?)</a:t>
+            </a:r>
+          </a:p>
+          <a:p>
+            <a:r>
+              <a:rPr lang="es-AR" dirty="0"/>
+              <a:t>Visualizar las ventajas de utilizar estas prácticas (¿Por qué?)</a:t>
+            </a:r>
+          </a:p>
+          <a:p>
+            <a:r>
+              <a:rPr lang="es-AR" dirty="0"/>
+              <a:t>Heredé código legacy no </a:t>
+            </a:r>
+            <a:r>
+              <a:rPr lang="es-AR" dirty="0" err="1"/>
+              <a:t>testeable</a:t>
+            </a:r>
+            <a:r>
+              <a:rPr lang="es-AR" dirty="0"/>
+              <a:t>. ¿Por dónde </a:t>
+            </a:r>
+            <a:r>
+              <a:rPr lang="es-AR" dirty="0" smtClean="0"/>
+              <a:t>empezamos?</a:t>
+            </a:r>
+            <a:endParaRPr lang="es-AR" dirty="0"/>
+          </a:p>
+        </p:txBody>
+      </p:sp>
+    </p:spTree>
+    <p:extLst>
+      <p:ext uri="{BB962C8B-B14F-4D97-AF65-F5344CB8AC3E}">
+        <p14:creationId xmlns:p14="http://schemas.microsoft.com/office/powerpoint/2010/main" val="647571016"/>
+      </p:ext>
+    </p:extLst>
+  </p:cSld>
+  <p:clrMapOvr>
+    <a:masterClrMapping/>
+  </p:clrMapOvr>
+  <p:timing>
+    <p:tnLst>
+      <p:par>
+        <p:cTn id="1" dur="indefinite" restart="never" nodeType="tmRoot"/>
+      </p:par>
+    </p:tnLst>
+  </p:timing>
+</p:sld>
+</file>
+
+<file path=ppt/slides/slide6.xml><?xml version="1.0" encoding="utf-8"?>
+<p:sld xmlns:a="http://schemas.openxmlformats.org/drawingml/2006/main" xmlns:r="http://schemas.openxmlformats.org/officeDocument/2006/relationships" xmlns:p="http://schemas.openxmlformats.org/presentationml/2006/main">
+  <p:cSld>
+    <p:spTree>
+      <p:nvGrpSpPr>
+        <p:cNvPr id="1" name=""/>
+        <p:cNvGrpSpPr/>
+        <p:nvPr/>
+      </p:nvGrpSpPr>
+      <p:grpSpPr>
+        <a:xfrm>
+          <a:off x="0" y="0"/>
+          <a:ext cx="0" cy="0"/>
+          <a:chOff x="0" y="0"/>
+          <a:chExt cx="0" cy="0"/>
+        </a:xfrm>
+      </p:grpSpPr>
+      <p:sp>
+        <p:nvSpPr>
           <p:cNvPr id="4" name="Title 3"/>
           <p:cNvSpPr>
             <a:spLocks noGrp="1"/>
@@ -11388,7 +11756,7 @@
 </p:sld>
 </file>
 
-<file path=ppt/slides/slide6.xml><?xml version="1.0" encoding="utf-8"?>
+<file path=ppt/slides/slide7.xml><?xml version="1.0" encoding="utf-8"?>
 <p:sld xmlns:a="http://schemas.openxmlformats.org/drawingml/2006/main" xmlns:r="http://schemas.openxmlformats.org/officeDocument/2006/relationships" xmlns:p="http://schemas.openxmlformats.org/presentationml/2006/main">
   <p:cSld>
     <p:spTree>
@@ -11569,137 +11937,6 @@
 </p:sld>
 </file>
 
-<file path=ppt/slides/slide7.xml><?xml version="1.0" encoding="utf-8"?>
-<p:sld xmlns:a="http://schemas.openxmlformats.org/drawingml/2006/main" xmlns:r="http://schemas.openxmlformats.org/officeDocument/2006/relationships" xmlns:p="http://schemas.openxmlformats.org/presentationml/2006/main">
-  <p:cSld>
-    <p:spTree>
-      <p:nvGrpSpPr>
-        <p:cNvPr id="1" name=""/>
-        <p:cNvGrpSpPr/>
-        <p:nvPr/>
-      </p:nvGrpSpPr>
-      <p:grpSpPr>
-        <a:xfrm>
-          <a:off x="0" y="0"/>
-          <a:ext cx="0" cy="0"/>
-          <a:chOff x="0" y="0"/>
-          <a:chExt cx="0" cy="0"/>
-        </a:xfrm>
-      </p:grpSpPr>
-      <p:sp>
-        <p:nvSpPr>
-          <p:cNvPr id="2" name="Title 1"/>
-          <p:cNvSpPr>
-            <a:spLocks noGrp="1"/>
-          </p:cNvSpPr>
-          <p:nvPr>
-            <p:ph type="title"/>
-          </p:nvPr>
-        </p:nvSpPr>
-        <p:spPr/>
-        <p:txBody>
-          <a:bodyPr/>
-          <a:lstStyle/>
-          <a:p>
-            <a:r>
-              <a:rPr lang="en-US" dirty="0"/>
-              <a:t>Tests </a:t>
-            </a:r>
-            <a:r>
-              <a:rPr lang="en-US" dirty="0" err="1"/>
-              <a:t>unitarios</a:t>
-            </a:r>
-            <a:endParaRPr lang="en-US" dirty="0"/>
-          </a:p>
-        </p:txBody>
-      </p:sp>
-      <p:sp>
-        <p:nvSpPr>
-          <p:cNvPr id="3" name="Content Placeholder 2"/>
-          <p:cNvSpPr>
-            <a:spLocks noGrp="1"/>
-          </p:cNvSpPr>
-          <p:nvPr>
-            <p:ph idx="1"/>
-          </p:nvPr>
-        </p:nvSpPr>
-        <p:spPr/>
-        <p:txBody>
-          <a:bodyPr vert="horz" lIns="91440" tIns="45720" rIns="91440" bIns="45720" rtlCol="0">
-            <a:normAutofit/>
-          </a:bodyPr>
-          <a:lstStyle/>
-          <a:p>
-            <a:r>
-              <a:rPr lang="es-AR" altLang="es-AR" dirty="0"/>
-              <a:t>¿Qué es un test unitario?</a:t>
-            </a:r>
-          </a:p>
-          <a:p>
-            <a:pPr lvl="1"/>
-            <a:r>
-              <a:rPr lang="es-AR" altLang="es-AR" dirty="0"/>
-              <a:t>Es un test que se realiza </a:t>
-            </a:r>
-            <a:r>
-              <a:rPr lang="es-AR" altLang="es-AR" dirty="0" smtClean="0"/>
-              <a:t>abstrayendo </a:t>
-            </a:r>
-            <a:r>
-              <a:rPr lang="es-AR" altLang="es-AR" dirty="0"/>
-              <a:t>el objeto a testear de sus dependencias con otros </a:t>
-            </a:r>
-            <a:r>
-              <a:rPr lang="es-AR" altLang="es-AR" dirty="0" smtClean="0"/>
-              <a:t>componentes</a:t>
-            </a:r>
-          </a:p>
-        </p:txBody>
-      </p:sp>
-      <p:pic>
-        <p:nvPicPr>
-          <p:cNvPr id="4" name="Picture 3"/>
-          <p:cNvPicPr>
-            <a:picLocks noChangeAspect="1"/>
-          </p:cNvPicPr>
-          <p:nvPr/>
-        </p:nvPicPr>
-        <p:blipFill>
-          <a:blip r:embed="rId2"/>
-          <a:stretch>
-            <a:fillRect/>
-          </a:stretch>
-        </p:blipFill>
-        <p:spPr>
-          <a:xfrm>
-            <a:off x="4555959" y="3587032"/>
-            <a:ext cx="3080081" cy="1919872"/>
-          </a:xfrm>
-          <a:prstGeom prst="rect">
-            <a:avLst/>
-          </a:prstGeom>
-        </p:spPr>
-      </p:pic>
-    </p:spTree>
-    <p:extLst>
-      <p:ext uri="{BB962C8B-B14F-4D97-AF65-F5344CB8AC3E}">
-        <p14:creationId xmlns:p14="http://schemas.microsoft.com/office/powerpoint/2010/main" val="3546300666"/>
-      </p:ext>
-    </p:extLst>
-  </p:cSld>
-  <p:clrMapOvr>
-    <a:masterClrMapping/>
-  </p:clrMapOvr>
-  <p:timing>
-    <p:tnLst>
-      <p:par>
-        <p:cTn id="1" dur="indefinite" restart="never" nodeType="tmRoot"/>
-      </p:par>
-    </p:tnLst>
-  </p:timing>
-</p:sld>
-</file>
-
 <file path=ppt/slides/slide8.xml><?xml version="1.0" encoding="utf-8"?>
 <p:sld xmlns:a="http://schemas.openxmlformats.org/drawingml/2006/main" xmlns:r="http://schemas.openxmlformats.org/officeDocument/2006/relationships" xmlns:p="http://schemas.openxmlformats.org/presentationml/2006/main">
   <p:cSld>
@@ -11762,318 +11999,59 @@
           <a:lstStyle/>
           <a:p>
             <a:r>
-              <a:rPr lang="en-US" dirty="0"/>
-              <a:t> Un </a:t>
-            </a:r>
-            <a:r>
-              <a:rPr lang="en-US" dirty="0" err="1"/>
-              <a:t>buen</a:t>
-            </a:r>
-            <a:r>
-              <a:rPr lang="en-US" dirty="0"/>
-              <a:t> test </a:t>
-            </a:r>
-            <a:r>
-              <a:rPr lang="en-US" dirty="0" err="1"/>
-              <a:t>unitario</a:t>
-            </a:r>
-            <a:r>
-              <a:rPr lang="en-US" dirty="0"/>
-              <a:t>:</a:t>
+              <a:rPr lang="es-AR" altLang="es-AR" dirty="0"/>
+              <a:t>¿Qué es un test unitario?</a:t>
             </a:r>
           </a:p>
           <a:p>
             <a:pPr lvl="1"/>
             <a:r>
-              <a:rPr lang="en-US" dirty="0" err="1"/>
-              <a:t>Documenta</a:t>
-            </a:r>
-            <a:r>
-              <a:rPr lang="en-US" dirty="0"/>
-              <a:t> el </a:t>
-            </a:r>
-            <a:r>
-              <a:rPr lang="en-US" dirty="0" err="1"/>
-              <a:t>diseño</a:t>
-            </a:r>
-            <a:r>
-              <a:rPr lang="en-US" dirty="0"/>
-              <a:t> de la </a:t>
-            </a:r>
-            <a:r>
-              <a:rPr lang="en-US" dirty="0" err="1"/>
-              <a:t>aplicación</a:t>
-            </a:r>
-            <a:endParaRPr lang="en-US" dirty="0"/>
-          </a:p>
-          <a:p>
-            <a:pPr lvl="1"/>
-            <a:r>
-              <a:rPr lang="en-US" dirty="0" err="1"/>
-              <a:t>Tiene</a:t>
-            </a:r>
-            <a:r>
-              <a:rPr lang="en-US" dirty="0"/>
-              <a:t> control total de </a:t>
-            </a:r>
-            <a:r>
-              <a:rPr lang="en-US" dirty="0" err="1"/>
-              <a:t>todos</a:t>
-            </a:r>
-            <a:r>
-              <a:rPr lang="en-US" dirty="0"/>
-              <a:t> </a:t>
-            </a:r>
-            <a:r>
-              <a:rPr lang="en-US" dirty="0" err="1"/>
-              <a:t>los</a:t>
-            </a:r>
-            <a:r>
-              <a:rPr lang="en-US" dirty="0"/>
-              <a:t> </a:t>
-            </a:r>
-            <a:r>
-              <a:rPr lang="en-US" dirty="0" err="1"/>
+              <a:rPr lang="es-AR" altLang="es-AR" dirty="0"/>
+              <a:t>Es un test que se realiza </a:t>
+            </a:r>
+            <a:r>
+              <a:rPr lang="es-AR" altLang="es-AR" dirty="0" smtClean="0"/>
+              <a:t>abstrayendo </a:t>
+            </a:r>
+            <a:r>
+              <a:rPr lang="es-AR" altLang="es-AR" dirty="0"/>
+              <a:t>el objeto a testear de sus dependencias con otros </a:t>
+            </a:r>
+            <a:r>
+              <a:rPr lang="es-AR" altLang="es-AR" dirty="0" smtClean="0"/>
               <a:t>componentes</a:t>
             </a:r>
-            <a:r>
-              <a:rPr lang="en-US" dirty="0"/>
-              <a:t> </a:t>
-            </a:r>
-            <a:r>
-              <a:rPr lang="en-US" dirty="0" err="1"/>
-              <a:t>en</a:t>
-            </a:r>
-            <a:r>
-              <a:rPr lang="en-US" dirty="0"/>
-              <a:t> </a:t>
-            </a:r>
-            <a:r>
-              <a:rPr lang="en-US" dirty="0" err="1"/>
-              <a:t>ejecución</a:t>
-            </a:r>
-            <a:endParaRPr lang="en-US" dirty="0"/>
-          </a:p>
-          <a:p>
-            <a:pPr lvl="1"/>
-            <a:r>
-              <a:rPr lang="en-US" dirty="0" err="1"/>
-              <a:t>Puede</a:t>
-            </a:r>
-            <a:r>
-              <a:rPr lang="en-US" dirty="0"/>
-              <a:t> </a:t>
-            </a:r>
-            <a:r>
-              <a:rPr lang="en-US" dirty="0" err="1"/>
-              <a:t>ejecutarse</a:t>
-            </a:r>
-            <a:r>
-              <a:rPr lang="en-US" dirty="0"/>
-              <a:t> </a:t>
-            </a:r>
-            <a:r>
-              <a:rPr lang="en-US" dirty="0" err="1"/>
-              <a:t>en</a:t>
-            </a:r>
-            <a:r>
-              <a:rPr lang="en-US" dirty="0"/>
-              <a:t> </a:t>
-            </a:r>
-            <a:r>
-              <a:rPr lang="en-US" dirty="0" err="1"/>
-              <a:t>cualquier</a:t>
-            </a:r>
-            <a:r>
-              <a:rPr lang="en-US" dirty="0"/>
-              <a:t> </a:t>
-            </a:r>
-            <a:r>
-              <a:rPr lang="en-US" dirty="0" err="1"/>
-              <a:t>orden</a:t>
-            </a:r>
-            <a:r>
-              <a:rPr lang="en-US" dirty="0"/>
-              <a:t> </a:t>
-            </a:r>
-            <a:r>
-              <a:rPr lang="en-US" dirty="0" err="1"/>
-              <a:t>si</a:t>
-            </a:r>
-            <a:r>
-              <a:rPr lang="en-US" dirty="0"/>
-              <a:t> </a:t>
-            </a:r>
-            <a:r>
-              <a:rPr lang="en-US" dirty="0" err="1"/>
-              <a:t>es</a:t>
-            </a:r>
-            <a:r>
-              <a:rPr lang="en-US" dirty="0"/>
-              <a:t> parte de </a:t>
-            </a:r>
-            <a:r>
-              <a:rPr lang="en-US" dirty="0" err="1"/>
-              <a:t>muchos</a:t>
-            </a:r>
-            <a:r>
-              <a:rPr lang="en-US" dirty="0"/>
-              <a:t> </a:t>
-            </a:r>
-            <a:r>
-              <a:rPr lang="en-US" dirty="0" err="1"/>
-              <a:t>otros</a:t>
-            </a:r>
-            <a:r>
-              <a:rPr lang="en-US" dirty="0"/>
-              <a:t> tests</a:t>
-            </a:r>
-          </a:p>
-          <a:p>
-            <a:pPr lvl="1"/>
-            <a:r>
-              <a:rPr lang="en-US" dirty="0" err="1"/>
-              <a:t>Retorna</a:t>
-            </a:r>
-            <a:r>
-              <a:rPr lang="en-US" dirty="0"/>
-              <a:t> </a:t>
-            </a:r>
-            <a:r>
-              <a:rPr lang="en-US" dirty="0" err="1"/>
-              <a:t>consistentemente</a:t>
-            </a:r>
-            <a:r>
-              <a:rPr lang="en-US" dirty="0"/>
-              <a:t> el </a:t>
-            </a:r>
-            <a:r>
-              <a:rPr lang="en-US" dirty="0" err="1"/>
-              <a:t>mismo</a:t>
-            </a:r>
-            <a:r>
-              <a:rPr lang="en-US" dirty="0"/>
-              <a:t> </a:t>
-            </a:r>
-            <a:r>
-              <a:rPr lang="en-US" dirty="0" err="1"/>
-              <a:t>resultado</a:t>
-            </a:r>
-            <a:endParaRPr lang="en-US" dirty="0"/>
-          </a:p>
-          <a:p>
-            <a:pPr lvl="1"/>
-            <a:r>
-              <a:rPr lang="en-US" dirty="0" err="1"/>
-              <a:t>Prueba</a:t>
-            </a:r>
-            <a:r>
-              <a:rPr lang="en-US" dirty="0"/>
-              <a:t> un </a:t>
-            </a:r>
-            <a:r>
-              <a:rPr lang="en-US" dirty="0" err="1"/>
-              <a:t>único</a:t>
-            </a:r>
-            <a:r>
-              <a:rPr lang="en-US" dirty="0"/>
-              <a:t> </a:t>
-            </a:r>
-            <a:r>
-              <a:rPr lang="en-US" dirty="0" err="1"/>
-              <a:t>concepto</a:t>
-            </a:r>
-            <a:r>
-              <a:rPr lang="en-US" dirty="0"/>
-              <a:t> </a:t>
-            </a:r>
-            <a:r>
-              <a:rPr lang="en-US" dirty="0" err="1"/>
-              <a:t>lógico</a:t>
-            </a:r>
-            <a:r>
-              <a:rPr lang="en-US" dirty="0"/>
-              <a:t> </a:t>
-            </a:r>
-            <a:r>
-              <a:rPr lang="en-US" dirty="0" err="1"/>
-              <a:t>en</a:t>
-            </a:r>
-            <a:r>
-              <a:rPr lang="en-US" dirty="0"/>
-              <a:t> el </a:t>
-            </a:r>
-            <a:r>
-              <a:rPr lang="en-US" dirty="0" err="1"/>
-              <a:t>sistema</a:t>
-            </a:r>
-            <a:endParaRPr lang="en-US" dirty="0"/>
-          </a:p>
-          <a:p>
-            <a:pPr lvl="1"/>
-            <a:r>
-              <a:rPr lang="en-US" dirty="0" err="1"/>
-              <a:t>Tiene</a:t>
-            </a:r>
-            <a:r>
-              <a:rPr lang="en-US" dirty="0"/>
-              <a:t> un </a:t>
-            </a:r>
-            <a:r>
-              <a:rPr lang="en-US" dirty="0" err="1"/>
-              <a:t>nombre</a:t>
-            </a:r>
-            <a:r>
-              <a:rPr lang="en-US" dirty="0"/>
-              <a:t> </a:t>
-            </a:r>
-            <a:r>
-              <a:rPr lang="en-US" dirty="0" err="1"/>
-              <a:t>claro</a:t>
-            </a:r>
-            <a:r>
-              <a:rPr lang="en-US" dirty="0"/>
-              <a:t> y </a:t>
-            </a:r>
-            <a:r>
-              <a:rPr lang="en-US" dirty="0" err="1"/>
-              <a:t>consistente</a:t>
-            </a:r>
-            <a:endParaRPr lang="en-US" dirty="0"/>
-          </a:p>
-          <a:p>
-            <a:pPr lvl="1"/>
-            <a:r>
-              <a:rPr lang="en-US" dirty="0" err="1"/>
-              <a:t>Es</a:t>
-            </a:r>
-            <a:r>
-              <a:rPr lang="en-US" dirty="0"/>
-              <a:t> legible</a:t>
-            </a:r>
-          </a:p>
-          <a:p>
-            <a:pPr lvl="1"/>
-            <a:r>
-              <a:rPr lang="en-US" dirty="0" err="1"/>
-              <a:t>Es</a:t>
-            </a:r>
-            <a:r>
-              <a:rPr lang="en-US" dirty="0"/>
-              <a:t> </a:t>
-            </a:r>
-            <a:r>
-              <a:rPr lang="en-US" dirty="0" err="1"/>
-              <a:t>mantenible</a:t>
-            </a:r>
-            <a:endParaRPr lang="en-US" dirty="0"/>
           </a:p>
         </p:txBody>
       </p:sp>
+      <p:pic>
+        <p:nvPicPr>
+          <p:cNvPr id="4" name="Picture 3"/>
+          <p:cNvPicPr>
+            <a:picLocks noChangeAspect="1"/>
+          </p:cNvPicPr>
+          <p:nvPr/>
+        </p:nvPicPr>
+        <p:blipFill>
+          <a:blip r:embed="rId2"/>
+          <a:stretch>
+            <a:fillRect/>
+          </a:stretch>
+        </p:blipFill>
+        <p:spPr>
+          <a:xfrm>
+            <a:off x="4555959" y="3587032"/>
+            <a:ext cx="3080081" cy="1919872"/>
+          </a:xfrm>
+          <a:prstGeom prst="rect">
+            <a:avLst/>
+          </a:prstGeom>
+        </p:spPr>
+      </p:pic>
     </p:spTree>
     <p:extLst>
       <p:ext uri="{BB962C8B-B14F-4D97-AF65-F5344CB8AC3E}">
-        <p14:creationId xmlns:p14="http://schemas.microsoft.com/office/powerpoint/2010/main" val="2140986603"/>
+        <p14:creationId xmlns:p14="http://schemas.microsoft.com/office/powerpoint/2010/main" val="3546300666"/>
       </p:ext>
     </p:extLst>
   </p:cSld>
@@ -12152,141 +12130,318 @@
           <a:lstStyle/>
           <a:p>
             <a:r>
-              <a:rPr lang="es-AR" dirty="0" smtClean="0"/>
-              <a:t>Utilizar </a:t>
-            </a:r>
-            <a:r>
-              <a:rPr lang="es-AR" dirty="0" err="1" smtClean="0"/>
-              <a:t>tests</a:t>
-            </a:r>
-            <a:r>
-              <a:rPr lang="es-AR" dirty="0" smtClean="0"/>
-              <a:t> unitarios:</a:t>
-            </a:r>
-            <a:endParaRPr lang="es-AR" dirty="0"/>
+              <a:rPr lang="en-US" dirty="0"/>
+              <a:t> Un </a:t>
+            </a:r>
+            <a:r>
+              <a:rPr lang="en-US" dirty="0" err="1"/>
+              <a:t>buen</a:t>
+            </a:r>
+            <a:r>
+              <a:rPr lang="en-US" dirty="0"/>
+              <a:t> test </a:t>
+            </a:r>
+            <a:r>
+              <a:rPr lang="en-US" dirty="0" err="1"/>
+              <a:t>unitario</a:t>
+            </a:r>
+            <a:r>
+              <a:rPr lang="en-US" dirty="0"/>
+              <a:t>:</a:t>
+            </a:r>
           </a:p>
           <a:p>
             <a:pPr lvl="1"/>
             <a:r>
-              <a:rPr lang="es-AR" dirty="0" smtClean="0"/>
-              <a:t>Minimiza </a:t>
-            </a:r>
-            <a:r>
-              <a:rPr lang="es-AR" dirty="0"/>
-              <a:t>el número de errores en el producto final</a:t>
-            </a:r>
+              <a:rPr lang="en-US" dirty="0" err="1"/>
+              <a:t>Documenta</a:t>
+            </a:r>
+            <a:r>
+              <a:rPr lang="en-US" dirty="0"/>
+              <a:t> el </a:t>
+            </a:r>
+            <a:r>
+              <a:rPr lang="en-US" dirty="0" err="1"/>
+              <a:t>diseño</a:t>
+            </a:r>
+            <a:r>
+              <a:rPr lang="en-US" dirty="0"/>
+              <a:t> de la </a:t>
+            </a:r>
+            <a:r>
+              <a:rPr lang="en-US" dirty="0" err="1"/>
+              <a:t>aplicación</a:t>
+            </a:r>
+            <a:endParaRPr lang="en-US" dirty="0"/>
           </a:p>
           <a:p>
             <a:pPr lvl="1"/>
             <a:r>
-              <a:rPr lang="es-AR" dirty="0" smtClean="0"/>
-              <a:t>Hace </a:t>
-            </a:r>
-            <a:r>
-              <a:rPr lang="es-AR" dirty="0"/>
-              <a:t>el código más </a:t>
-            </a:r>
-            <a:r>
-              <a:rPr lang="es-AR" dirty="0" err="1"/>
+              <a:rPr lang="en-US" dirty="0" err="1"/>
+              <a:t>Tiene</a:t>
+            </a:r>
+            <a:r>
+              <a:rPr lang="en-US" dirty="0"/>
+              <a:t> control total de </a:t>
+            </a:r>
+            <a:r>
+              <a:rPr lang="en-US" dirty="0" err="1"/>
+              <a:t>todos</a:t>
+            </a:r>
+            <a:r>
+              <a:rPr lang="en-US" dirty="0"/>
+              <a:t> </a:t>
+            </a:r>
+            <a:r>
+              <a:rPr lang="en-US" dirty="0" err="1"/>
+              <a:t>los</a:t>
+            </a:r>
+            <a:r>
+              <a:rPr lang="en-US" dirty="0"/>
+              <a:t> </a:t>
+            </a:r>
+            <a:r>
+              <a:rPr lang="en-US" dirty="0" err="1"/>
+              <a:t>componentes</a:t>
+            </a:r>
+            <a:r>
+              <a:rPr lang="en-US" dirty="0"/>
+              <a:t> </a:t>
+            </a:r>
+            <a:r>
+              <a:rPr lang="en-US" dirty="0" err="1"/>
+              <a:t>en</a:t>
+            </a:r>
+            <a:r>
+              <a:rPr lang="en-US" dirty="0"/>
+              <a:t> </a:t>
+            </a:r>
+            <a:r>
+              <a:rPr lang="en-US" dirty="0" err="1"/>
+              <a:t>ejecución</a:t>
+            </a:r>
+            <a:endParaRPr lang="en-US" dirty="0"/>
+          </a:p>
+          <a:p>
+            <a:pPr lvl="1"/>
+            <a:r>
+              <a:rPr lang="en-US" dirty="0" err="1"/>
+              <a:t>Puede</a:t>
+            </a:r>
+            <a:r>
+              <a:rPr lang="en-US" dirty="0"/>
+              <a:t> </a:t>
+            </a:r>
+            <a:r>
+              <a:rPr lang="en-US" dirty="0" err="1"/>
+              <a:t>ejecutarse</a:t>
+            </a:r>
+            <a:r>
+              <a:rPr lang="en-US" dirty="0"/>
+              <a:t> </a:t>
+            </a:r>
+            <a:r>
+              <a:rPr lang="en-US" dirty="0" err="1"/>
+              <a:t>en</a:t>
+            </a:r>
+            <a:r>
+              <a:rPr lang="en-US" dirty="0"/>
+              <a:t> </a:t>
+            </a:r>
+            <a:r>
+              <a:rPr lang="en-US" dirty="0" err="1"/>
+              <a:t>cualquier</a:t>
+            </a:r>
+            <a:r>
+              <a:rPr lang="en-US" dirty="0"/>
+              <a:t> </a:t>
+            </a:r>
+            <a:r>
+              <a:rPr lang="en-US" dirty="0" err="1"/>
+              <a:t>orden</a:t>
+            </a:r>
+            <a:r>
+              <a:rPr lang="en-US" dirty="0"/>
+              <a:t> </a:t>
+            </a:r>
+            <a:r>
+              <a:rPr lang="en-US" dirty="0" err="1"/>
+              <a:t>si</a:t>
+            </a:r>
+            <a:r>
+              <a:rPr lang="en-US" dirty="0"/>
+              <a:t> </a:t>
+            </a:r>
+            <a:r>
+              <a:rPr lang="en-US" dirty="0" err="1"/>
+              <a:t>es</a:t>
+            </a:r>
+            <a:r>
+              <a:rPr lang="en-US" dirty="0"/>
+              <a:t> parte de </a:t>
+            </a:r>
+            <a:r>
+              <a:rPr lang="en-US" dirty="0" err="1"/>
+              <a:t>muchos</a:t>
+            </a:r>
+            <a:r>
+              <a:rPr lang="en-US" dirty="0"/>
+              <a:t> </a:t>
+            </a:r>
+            <a:r>
+              <a:rPr lang="en-US" dirty="0" err="1"/>
+              <a:t>otros</a:t>
+            </a:r>
+            <a:r>
+              <a:rPr lang="en-US" dirty="0"/>
+              <a:t> tests</a:t>
+            </a:r>
+          </a:p>
+          <a:p>
+            <a:pPr lvl="1"/>
+            <a:r>
+              <a:rPr lang="en-US" dirty="0" err="1"/>
+              <a:t>Retorna</a:t>
+            </a:r>
+            <a:r>
+              <a:rPr lang="en-US" dirty="0"/>
+              <a:t> </a:t>
+            </a:r>
+            <a:r>
+              <a:rPr lang="en-US" dirty="0" err="1"/>
+              <a:t>consistentemente</a:t>
+            </a:r>
+            <a:r>
+              <a:rPr lang="en-US" dirty="0"/>
+              <a:t> el </a:t>
+            </a:r>
+            <a:r>
+              <a:rPr lang="en-US" dirty="0" err="1"/>
+              <a:t>mismo</a:t>
+            </a:r>
+            <a:r>
+              <a:rPr lang="en-US" dirty="0"/>
+              <a:t> </a:t>
+            </a:r>
+            <a:r>
+              <a:rPr lang="en-US" dirty="0" err="1"/>
+              <a:t>resultado</a:t>
+            </a:r>
+            <a:endParaRPr lang="en-US" dirty="0"/>
+          </a:p>
+          <a:p>
+            <a:pPr lvl="1"/>
+            <a:r>
+              <a:rPr lang="en-US" dirty="0" err="1"/>
+              <a:t>Prueba</a:t>
+            </a:r>
+            <a:r>
+              <a:rPr lang="en-US" dirty="0"/>
+              <a:t> un </a:t>
+            </a:r>
+            <a:r>
+              <a:rPr lang="en-US" dirty="0" err="1"/>
+              <a:t>único</a:t>
+            </a:r>
+            <a:r>
+              <a:rPr lang="en-US" dirty="0"/>
+              <a:t> </a:t>
+            </a:r>
+            <a:r>
+              <a:rPr lang="en-US" dirty="0" err="1"/>
+              <a:t>concepto</a:t>
+            </a:r>
+            <a:r>
+              <a:rPr lang="en-US" dirty="0"/>
+              <a:t> </a:t>
+            </a:r>
+            <a:r>
+              <a:rPr lang="en-US" dirty="0" err="1"/>
+              <a:t>lógico</a:t>
+            </a:r>
+            <a:r>
+              <a:rPr lang="en-US" dirty="0"/>
+              <a:t> </a:t>
+            </a:r>
+            <a:r>
+              <a:rPr lang="en-US" dirty="0" err="1"/>
+              <a:t>en</a:t>
+            </a:r>
+            <a:r>
+              <a:rPr lang="en-US" dirty="0"/>
+              <a:t> el </a:t>
+            </a:r>
+            <a:r>
+              <a:rPr lang="en-US" dirty="0" err="1"/>
+              <a:t>sistema</a:t>
+            </a:r>
+            <a:endParaRPr lang="en-US" dirty="0"/>
+          </a:p>
+          <a:p>
+            <a:pPr lvl="1"/>
+            <a:r>
+              <a:rPr lang="en-US" dirty="0" err="1"/>
+              <a:t>Tiene</a:t>
+            </a:r>
+            <a:r>
+              <a:rPr lang="en-US" dirty="0"/>
+              <a:t> un </a:t>
+            </a:r>
+            <a:r>
+              <a:rPr lang="en-US" dirty="0" err="1"/>
+              <a:t>nombre</a:t>
+            </a:r>
+            <a:r>
+              <a:rPr lang="en-US" dirty="0"/>
+              <a:t> </a:t>
+            </a:r>
+            <a:r>
+              <a:rPr lang="en-US" dirty="0" err="1"/>
+              <a:t>claro</a:t>
+            </a:r>
+            <a:r>
+              <a:rPr lang="en-US" dirty="0"/>
+              <a:t> y </a:t>
+            </a:r>
+            <a:r>
+              <a:rPr lang="en-US" dirty="0" err="1"/>
+              <a:t>consistente</a:t>
+            </a:r>
+            <a:endParaRPr lang="en-US" dirty="0"/>
+          </a:p>
+          <a:p>
+            <a:pPr lvl="1"/>
+            <a:r>
+              <a:rPr lang="en-US" dirty="0" err="1"/>
+              <a:t>Es</a:t>
+            </a:r>
+            <a:r>
+              <a:rPr lang="en-US" dirty="0"/>
+              <a:t> legible</a:t>
+            </a:r>
+          </a:p>
+          <a:p>
+            <a:pPr lvl="1"/>
+            <a:r>
+              <a:rPr lang="en-US" dirty="0" err="1"/>
+              <a:t>Es</a:t>
+            </a:r>
+            <a:r>
+              <a:rPr lang="en-US" dirty="0"/>
+              <a:t> </a:t>
+            </a:r>
+            <a:r>
+              <a:rPr lang="en-US" dirty="0" err="1"/>
               <a:t>mantenible</a:t>
             </a:r>
-            <a:endParaRPr lang="es-AR" dirty="0"/>
-          </a:p>
-          <a:p>
-            <a:pPr lvl="1"/>
-            <a:r>
-              <a:rPr lang="es-AR" dirty="0" smtClean="0"/>
-              <a:t>Permite </a:t>
-            </a:r>
-            <a:r>
-              <a:rPr lang="es-AR" dirty="0"/>
-              <a:t>la detección temprana de errores en el ambiente de desarrollo</a:t>
-            </a:r>
-          </a:p>
-          <a:p>
-            <a:pPr lvl="1"/>
-            <a:r>
-              <a:rPr lang="es-AR" dirty="0" smtClean="0"/>
-              <a:t>Reduce </a:t>
-            </a:r>
-            <a:r>
-              <a:rPr lang="es-AR" dirty="0"/>
-              <a:t>el tiempo de desarrollo y mantenimiento durante el ciclo de vida de un proyecto</a:t>
-            </a:r>
-          </a:p>
-          <a:p>
-            <a:pPr lvl="1"/>
-            <a:r>
-              <a:rPr lang="es-AR" dirty="0" smtClean="0"/>
-              <a:t>Permite </a:t>
-            </a:r>
-            <a:r>
-              <a:rPr lang="es-AR" dirty="0"/>
-              <a:t>generar métricas de cobertura de código</a:t>
-            </a:r>
-          </a:p>
-          <a:p>
-            <a:pPr lvl="1"/>
-            <a:r>
-              <a:rPr lang="es-AR" b="1" dirty="0" smtClean="0"/>
-              <a:t>Mejora </a:t>
-            </a:r>
-            <a:r>
-              <a:rPr lang="es-AR" b="1" dirty="0"/>
-              <a:t>la calidad del producto final</a:t>
-            </a:r>
-          </a:p>
-          <a:p>
-            <a:pPr lvl="1"/>
-            <a:endParaRPr lang="es-AR" dirty="0"/>
+            <a:endParaRPr lang="en-US" dirty="0"/>
           </a:p>
         </p:txBody>
       </p:sp>
-      <p:pic>
-        <p:nvPicPr>
-          <p:cNvPr id="4" name="Picture 2" descr="Trabajador con un megÃ¡fono"/>
-          <p:cNvPicPr>
-            <a:picLocks noChangeAspect="1" noChangeArrowheads="1"/>
-          </p:cNvPicPr>
-          <p:nvPr/>
-        </p:nvPicPr>
-        <p:blipFill>
-          <a:blip r:embed="rId2">
-            <a:extLst>
-              <a:ext uri="{28A0092B-C50C-407E-A947-70E740481C1C}">
-                <a14:useLocalDpi xmlns:a14="http://schemas.microsoft.com/office/drawing/2010/main" val="0"/>
-              </a:ext>
-            </a:extLst>
-          </a:blip>
-          <a:srcRect/>
-          <a:stretch>
-            <a:fillRect/>
-          </a:stretch>
-        </p:blipFill>
-        <p:spPr bwMode="auto">
-          <a:xfrm>
-            <a:off x="9403836" y="155814"/>
-            <a:ext cx="2580346" cy="2580346"/>
-          </a:xfrm>
-          <a:prstGeom prst="rect">
-            <a:avLst/>
-          </a:prstGeom>
-          <a:noFill/>
-          <a:extLst>
-            <a:ext uri="{909E8E84-426E-40DD-AFC4-6F175D3DCCD1}">
-              <a14:hiddenFill xmlns:a14="http://schemas.microsoft.com/office/drawing/2010/main">
-                <a:solidFill>
-                  <a:srgbClr val="FFFFFF"/>
-                </a:solidFill>
-              </a14:hiddenFill>
-            </a:ext>
-          </a:extLst>
-        </p:spPr>
-      </p:pic>
     </p:spTree>
     <p:extLst>
       <p:ext uri="{BB962C8B-B14F-4D97-AF65-F5344CB8AC3E}">
-        <p14:creationId xmlns:p14="http://schemas.microsoft.com/office/powerpoint/2010/main" val="1872446243"/>
+        <p14:creationId xmlns:p14="http://schemas.microsoft.com/office/powerpoint/2010/main" val="2140986603"/>
       </p:ext>
     </p:extLst>
   </p:cSld>

</xml_diff>